<commit_message>
add figures for new structure
</commit_message>
<xml_diff>
--- a/paper/figures/data_pipeline.pptx
+++ b/paper/figures/data_pipeline.pptx
@@ -5,10 +5,12 @@
     <p:sldMasterId id="2147483684" r:id="rId1"/>
   </p:sldMasterIdLst>
   <p:notesMasterIdLst>
-    <p:notesMasterId r:id="rId3"/>
+    <p:notesMasterId r:id="rId5"/>
   </p:notesMasterIdLst>
   <p:sldIdLst>
     <p:sldId id="258" r:id="rId2"/>
+    <p:sldId id="592" r:id="rId3"/>
+    <p:sldId id="593" r:id="rId4"/>
   </p:sldIdLst>
   <p:sldSz cx="8999538" cy="4319588"/>
   <p:notesSz cx="6858000" cy="9144000"/>
@@ -197,7 +199,7 @@
           <a:p>
             <a:fld id="{ACC8D1E5-734B-D648-9544-C1B3E7710CE7}" type="datetimeFigureOut">
               <a:rPr lang="en-GB" smtClean="0"/>
-              <a:t>21/01/2021</a:t>
+              <a:t>28/04/2021</a:t>
             </a:fld>
             <a:endParaRPr lang="en-GB"/>
           </a:p>
@@ -355,7 +357,7 @@
           <a:p>
             <a:fld id="{56E0D9BA-7F77-734C-9856-64914A163371}" type="slidenum">
               <a:rPr lang="en-GB" smtClean="0"/>
-              <a:t>‹#›</a:t>
+              <a:t>‹Nr.›</a:t>
             </a:fld>
             <a:endParaRPr lang="en-GB"/>
           </a:p>
@@ -684,7 +686,7 @@
           <a:p>
             <a:fld id="{70A666A6-2FAB-D348-B19D-8A510A298A73}" type="datetimeFigureOut">
               <a:rPr lang="en-GB" smtClean="0"/>
-              <a:t>21/01/2021</a:t>
+              <a:t>28/04/2021</a:t>
             </a:fld>
             <a:endParaRPr lang="en-GB"/>
           </a:p>
@@ -726,7 +728,7 @@
           <a:p>
             <a:fld id="{F818736A-FFF0-2D46-A8E8-BE11000C3203}" type="slidenum">
               <a:rPr lang="en-GB" smtClean="0"/>
-              <a:t>‹#›</a:t>
+              <a:t>‹Nr.›</a:t>
             </a:fld>
             <a:endParaRPr lang="en-GB"/>
           </a:p>
@@ -854,7 +856,7 @@
           <a:p>
             <a:fld id="{70A666A6-2FAB-D348-B19D-8A510A298A73}" type="datetimeFigureOut">
               <a:rPr lang="en-GB" smtClean="0"/>
-              <a:t>21/01/2021</a:t>
+              <a:t>28/04/2021</a:t>
             </a:fld>
             <a:endParaRPr lang="en-GB"/>
           </a:p>
@@ -896,7 +898,7 @@
           <a:p>
             <a:fld id="{F818736A-FFF0-2D46-A8E8-BE11000C3203}" type="slidenum">
               <a:rPr lang="en-GB" smtClean="0"/>
-              <a:t>‹#›</a:t>
+              <a:t>‹Nr.›</a:t>
             </a:fld>
             <a:endParaRPr lang="en-GB"/>
           </a:p>
@@ -1034,7 +1036,7 @@
           <a:p>
             <a:fld id="{70A666A6-2FAB-D348-B19D-8A510A298A73}" type="datetimeFigureOut">
               <a:rPr lang="en-GB" smtClean="0"/>
-              <a:t>21/01/2021</a:t>
+              <a:t>28/04/2021</a:t>
             </a:fld>
             <a:endParaRPr lang="en-GB"/>
           </a:p>
@@ -1076,7 +1078,7 @@
           <a:p>
             <a:fld id="{F818736A-FFF0-2D46-A8E8-BE11000C3203}" type="slidenum">
               <a:rPr lang="en-GB" smtClean="0"/>
-              <a:t>‹#›</a:t>
+              <a:t>‹Nr.›</a:t>
             </a:fld>
             <a:endParaRPr lang="en-GB"/>
           </a:p>
@@ -1092,6 +1094,273 @@
   <p:clrMapOvr>
     <a:masterClrMapping/>
   </p:clrMapOvr>
+</p:sldLayout>
+</file>
+
+<file path=ppt/slideLayouts/slideLayout12.xml><?xml version="1.0" encoding="utf-8"?>
+<p:sldLayout xmlns:a="http://schemas.openxmlformats.org/drawingml/2006/main" xmlns:r="http://schemas.openxmlformats.org/officeDocument/2006/relationships" xmlns:p="http://schemas.openxmlformats.org/presentationml/2006/main" userDrawn="1">
+  <p:cSld name="ViF_Folie nur Text">
+    <p:spTree>
+      <p:nvGrpSpPr>
+        <p:cNvPr id="1" name=""/>
+        <p:cNvGrpSpPr/>
+        <p:nvPr/>
+      </p:nvGrpSpPr>
+      <p:grpSpPr>
+        <a:xfrm>
+          <a:off x="0" y="0"/>
+          <a:ext cx="0" cy="0"/>
+          <a:chOff x="0" y="0"/>
+          <a:chExt cx="0" cy="0"/>
+        </a:xfrm>
+      </p:grpSpPr>
+      <p:sp>
+        <p:nvSpPr>
+          <p:cNvPr id="2" name="Titel 1"/>
+          <p:cNvSpPr>
+            <a:spLocks noGrp="1"/>
+          </p:cNvSpPr>
+          <p:nvPr>
+            <p:ph type="title"/>
+          </p:nvPr>
+        </p:nvSpPr>
+        <p:spPr>
+          <a:xfrm>
+            <a:off x="401241" y="102962"/>
+            <a:ext cx="6412991" cy="287956"/>
+          </a:xfrm>
+          <a:prstGeom prst="rect">
+            <a:avLst/>
+          </a:prstGeom>
+        </p:spPr>
+        <p:txBody>
+          <a:bodyPr lIns="0" tIns="0" bIns="0" anchor="ctr"/>
+          <a:lstStyle>
+            <a:lvl1pPr>
+              <a:defRPr sz="1143" b="1"/>
+            </a:lvl1pPr>
+          </a:lstStyle>
+          <a:p>
+            <a:r>
+              <a:rPr lang="de-DE"/>
+              <a:t>Titelmasterformat durch Klicken bearbeiten</a:t>
+            </a:r>
+            <a:endParaRPr lang="de-AT" dirty="0"/>
+          </a:p>
+        </p:txBody>
+      </p:sp>
+      <p:sp>
+        <p:nvSpPr>
+          <p:cNvPr id="3" name="Datumsplatzhalter 2"/>
+          <p:cNvSpPr>
+            <a:spLocks noGrp="1"/>
+          </p:cNvSpPr>
+          <p:nvPr>
+            <p:ph type="dt" sz="half" idx="10"/>
+          </p:nvPr>
+        </p:nvSpPr>
+        <p:spPr/>
+        <p:txBody>
+          <a:bodyPr/>
+          <a:lstStyle/>
+          <a:p>
+            <a:endParaRPr lang="de-AT" dirty="0">
+              <a:solidFill>
+                <a:srgbClr val="000000">
+                  <a:tint val="75000"/>
+                </a:srgbClr>
+              </a:solidFill>
+            </a:endParaRPr>
+          </a:p>
+        </p:txBody>
+      </p:sp>
+      <p:sp>
+        <p:nvSpPr>
+          <p:cNvPr id="4" name="Fußzeilenplatzhalter 3"/>
+          <p:cNvSpPr>
+            <a:spLocks noGrp="1"/>
+          </p:cNvSpPr>
+          <p:nvPr>
+            <p:ph type="ftr" sz="quarter" idx="11"/>
+          </p:nvPr>
+        </p:nvSpPr>
+        <p:spPr/>
+        <p:txBody>
+          <a:bodyPr/>
+          <a:lstStyle/>
+          <a:p>
+            <a:endParaRPr lang="de-AT" dirty="0">
+              <a:solidFill>
+                <a:srgbClr val="000000">
+                  <a:tint val="75000"/>
+                </a:srgbClr>
+              </a:solidFill>
+            </a:endParaRPr>
+          </a:p>
+        </p:txBody>
+      </p:sp>
+      <p:sp>
+        <p:nvSpPr>
+          <p:cNvPr id="5" name="Foliennummernplatzhalter 4"/>
+          <p:cNvSpPr>
+            <a:spLocks noGrp="1"/>
+          </p:cNvSpPr>
+          <p:nvPr>
+            <p:ph type="sldNum" sz="quarter" idx="12"/>
+          </p:nvPr>
+        </p:nvSpPr>
+        <p:spPr/>
+        <p:txBody>
+          <a:bodyPr/>
+          <a:lstStyle/>
+          <a:p>
+            <a:fld id="{2F3BB332-F7ED-43B3-92BF-86D2CC42DE36}" type="slidenum">
+              <a:rPr lang="de-AT" smtClean="0">
+                <a:solidFill>
+                  <a:srgbClr val="000000">
+                    <a:tint val="75000"/>
+                  </a:srgbClr>
+                </a:solidFill>
+              </a:rPr>
+              <a:pPr/>
+              <a:t>‹Nr.›</a:t>
+            </a:fld>
+            <a:endParaRPr lang="de-AT" dirty="0">
+              <a:solidFill>
+                <a:srgbClr val="000000">
+                  <a:tint val="75000"/>
+                </a:srgbClr>
+              </a:solidFill>
+            </a:endParaRPr>
+          </a:p>
+        </p:txBody>
+      </p:sp>
+      <p:cxnSp>
+        <p:nvCxnSpPr>
+          <p:cNvPr id="7" name="Gerade Verbindung 6"/>
+          <p:cNvCxnSpPr/>
+          <p:nvPr userDrawn="1"/>
+        </p:nvCxnSpPr>
+        <p:spPr bwMode="auto">
+          <a:xfrm>
+            <a:off x="389287" y="390919"/>
+            <a:ext cx="6424945" cy="1752"/>
+          </a:xfrm>
+          <a:prstGeom prst="line">
+            <a:avLst/>
+          </a:prstGeom>
+          <a:noFill/>
+          <a:ln w="12700" cap="flat" cmpd="sng" algn="ctr">
+            <a:solidFill>
+              <a:schemeClr val="bg1">
+                <a:lumMod val="75000"/>
+              </a:schemeClr>
+            </a:solidFill>
+            <a:prstDash val="solid"/>
+            <a:round/>
+            <a:headEnd type="none" w="med" len="med"/>
+            <a:tailEnd type="none" w="med" len="med"/>
+          </a:ln>
+          <a:effectLst/>
+        </p:spPr>
+      </p:cxnSp>
+      <p:sp>
+        <p:nvSpPr>
+          <p:cNvPr id="9" name="Textplatzhalter 8"/>
+          <p:cNvSpPr>
+            <a:spLocks noGrp="1"/>
+          </p:cNvSpPr>
+          <p:nvPr>
+            <p:ph type="body" sz="quarter" idx="14" hasCustomPrompt="1"/>
+          </p:nvPr>
+        </p:nvSpPr>
+        <p:spPr>
+          <a:xfrm>
+            <a:off x="401240" y="609267"/>
+            <a:ext cx="8450344" cy="3401676"/>
+          </a:xfrm>
+          <a:prstGeom prst="rect">
+            <a:avLst/>
+          </a:prstGeom>
+        </p:spPr>
+        <p:txBody>
+          <a:bodyPr lIns="0"/>
+          <a:lstStyle>
+            <a:lvl2pPr>
+              <a:spcBef>
+                <a:spcPts val="172"/>
+              </a:spcBef>
+              <a:spcAft>
+                <a:spcPts val="172"/>
+              </a:spcAft>
+              <a:defRPr/>
+            </a:lvl2pPr>
+            <a:lvl3pPr marL="515098" indent="-159608">
+              <a:spcBef>
+                <a:spcPts val="172"/>
+              </a:spcBef>
+              <a:spcAft>
+                <a:spcPts val="172"/>
+              </a:spcAft>
+              <a:defRPr/>
+            </a:lvl3pPr>
+            <a:lvl4pPr marL="667452" indent="-152353">
+              <a:spcBef>
+                <a:spcPts val="172"/>
+              </a:spcBef>
+              <a:spcAft>
+                <a:spcPts val="172"/>
+              </a:spcAft>
+              <a:buFont typeface="Symbol" panose="05050102010706020507" pitchFamily="18" charset="2"/>
+              <a:buChar char="-"/>
+              <a:defRPr>
+                <a:latin typeface="+mn-lt"/>
+              </a:defRPr>
+            </a:lvl4pPr>
+          </a:lstStyle>
+          <a:p>
+            <a:pPr lvl="0"/>
+            <a:r>
+              <a:rPr lang="de-DE" dirty="0"/>
+              <a:t>Textmasterformate durch Klicken bearbeiten</a:t>
+            </a:r>
+          </a:p>
+          <a:p>
+            <a:pPr lvl="1"/>
+            <a:r>
+              <a:rPr lang="de-DE" dirty="0"/>
+              <a:t>Erste Ebene</a:t>
+            </a:r>
+          </a:p>
+          <a:p>
+            <a:pPr lvl="2"/>
+            <a:r>
+              <a:rPr lang="de-DE" dirty="0"/>
+              <a:t>Zweite Ebene</a:t>
+            </a:r>
+          </a:p>
+          <a:p>
+            <a:pPr lvl="3"/>
+            <a:r>
+              <a:rPr lang="de-DE" dirty="0"/>
+              <a:t>Dritte Ebene</a:t>
+            </a:r>
+          </a:p>
+        </p:txBody>
+      </p:sp>
+    </p:spTree>
+    <p:extLst>
+      <p:ext uri="{BB962C8B-B14F-4D97-AF65-F5344CB8AC3E}">
+        <p14:creationId xmlns:p14="http://schemas.microsoft.com/office/powerpoint/2010/main" val="3064595102"/>
+      </p:ext>
+    </p:extLst>
+  </p:cSld>
+  <p:clrMapOvr>
+    <a:masterClrMapping/>
+  </p:clrMapOvr>
+  <p:transition spd="slow">
+    <p:wipe/>
+  </p:transition>
 </p:sldLayout>
 </file>
 
@@ -1204,7 +1473,7 @@
           <a:p>
             <a:fld id="{70A666A6-2FAB-D348-B19D-8A510A298A73}" type="datetimeFigureOut">
               <a:rPr lang="en-GB" smtClean="0"/>
-              <a:t>21/01/2021</a:t>
+              <a:t>28/04/2021</a:t>
             </a:fld>
             <a:endParaRPr lang="en-GB"/>
           </a:p>
@@ -1246,7 +1515,7 @@
           <a:p>
             <a:fld id="{F818736A-FFF0-2D46-A8E8-BE11000C3203}" type="slidenum">
               <a:rPr lang="en-GB" smtClean="0"/>
-              <a:t>‹#›</a:t>
+              <a:t>‹Nr.›</a:t>
             </a:fld>
             <a:endParaRPr lang="en-GB"/>
           </a:p>
@@ -1450,7 +1719,7 @@
           <a:p>
             <a:fld id="{70A666A6-2FAB-D348-B19D-8A510A298A73}" type="datetimeFigureOut">
               <a:rPr lang="en-GB" smtClean="0"/>
-              <a:t>21/01/2021</a:t>
+              <a:t>28/04/2021</a:t>
             </a:fld>
             <a:endParaRPr lang="en-GB"/>
           </a:p>
@@ -1492,7 +1761,7 @@
           <a:p>
             <a:fld id="{F818736A-FFF0-2D46-A8E8-BE11000C3203}" type="slidenum">
               <a:rPr lang="en-GB" smtClean="0"/>
-              <a:t>‹#›</a:t>
+              <a:t>‹Nr.›</a:t>
             </a:fld>
             <a:endParaRPr lang="en-GB"/>
           </a:p>
@@ -1682,7 +1951,7 @@
           <a:p>
             <a:fld id="{70A666A6-2FAB-D348-B19D-8A510A298A73}" type="datetimeFigureOut">
               <a:rPr lang="en-GB" smtClean="0"/>
-              <a:t>21/01/2021</a:t>
+              <a:t>28/04/2021</a:t>
             </a:fld>
             <a:endParaRPr lang="en-GB"/>
           </a:p>
@@ -1724,7 +1993,7 @@
           <a:p>
             <a:fld id="{F818736A-FFF0-2D46-A8E8-BE11000C3203}" type="slidenum">
               <a:rPr lang="en-GB" smtClean="0"/>
-              <a:t>‹#›</a:t>
+              <a:t>‹Nr.›</a:t>
             </a:fld>
             <a:endParaRPr lang="en-GB"/>
           </a:p>
@@ -2049,7 +2318,7 @@
           <a:p>
             <a:fld id="{70A666A6-2FAB-D348-B19D-8A510A298A73}" type="datetimeFigureOut">
               <a:rPr lang="en-GB" smtClean="0"/>
-              <a:t>21/01/2021</a:t>
+              <a:t>28/04/2021</a:t>
             </a:fld>
             <a:endParaRPr lang="en-GB"/>
           </a:p>
@@ -2091,7 +2360,7 @@
           <a:p>
             <a:fld id="{F818736A-FFF0-2D46-A8E8-BE11000C3203}" type="slidenum">
               <a:rPr lang="en-GB" smtClean="0"/>
-              <a:t>‹#›</a:t>
+              <a:t>‹Nr.›</a:t>
             </a:fld>
             <a:endParaRPr lang="en-GB"/>
           </a:p>
@@ -2167,7 +2436,7 @@
           <a:p>
             <a:fld id="{70A666A6-2FAB-D348-B19D-8A510A298A73}" type="datetimeFigureOut">
               <a:rPr lang="en-GB" smtClean="0"/>
-              <a:t>21/01/2021</a:t>
+              <a:t>28/04/2021</a:t>
             </a:fld>
             <a:endParaRPr lang="en-GB"/>
           </a:p>
@@ -2209,7 +2478,7 @@
           <a:p>
             <a:fld id="{F818736A-FFF0-2D46-A8E8-BE11000C3203}" type="slidenum">
               <a:rPr lang="en-GB" smtClean="0"/>
-              <a:t>‹#›</a:t>
+              <a:t>‹Nr.›</a:t>
             </a:fld>
             <a:endParaRPr lang="en-GB"/>
           </a:p>
@@ -2262,7 +2531,7 @@
           <a:p>
             <a:fld id="{70A666A6-2FAB-D348-B19D-8A510A298A73}" type="datetimeFigureOut">
               <a:rPr lang="en-GB" smtClean="0"/>
-              <a:t>21/01/2021</a:t>
+              <a:t>28/04/2021</a:t>
             </a:fld>
             <a:endParaRPr lang="en-GB"/>
           </a:p>
@@ -2304,7 +2573,7 @@
           <a:p>
             <a:fld id="{F818736A-FFF0-2D46-A8E8-BE11000C3203}" type="slidenum">
               <a:rPr lang="en-GB" smtClean="0"/>
-              <a:t>‹#›</a:t>
+              <a:t>‹Nr.›</a:t>
             </a:fld>
             <a:endParaRPr lang="en-GB"/>
           </a:p>
@@ -2539,7 +2808,7 @@
           <a:p>
             <a:fld id="{70A666A6-2FAB-D348-B19D-8A510A298A73}" type="datetimeFigureOut">
               <a:rPr lang="en-GB" smtClean="0"/>
-              <a:t>21/01/2021</a:t>
+              <a:t>28/04/2021</a:t>
             </a:fld>
             <a:endParaRPr lang="en-GB"/>
           </a:p>
@@ -2581,7 +2850,7 @@
           <a:p>
             <a:fld id="{F818736A-FFF0-2D46-A8E8-BE11000C3203}" type="slidenum">
               <a:rPr lang="en-GB" smtClean="0"/>
-              <a:t>‹#›</a:t>
+              <a:t>‹Nr.›</a:t>
             </a:fld>
             <a:endParaRPr lang="en-GB"/>
           </a:p>
@@ -2796,7 +3065,7 @@
           <a:p>
             <a:fld id="{70A666A6-2FAB-D348-B19D-8A510A298A73}" type="datetimeFigureOut">
               <a:rPr lang="en-GB" smtClean="0"/>
-              <a:t>21/01/2021</a:t>
+              <a:t>28/04/2021</a:t>
             </a:fld>
             <a:endParaRPr lang="en-GB"/>
           </a:p>
@@ -2838,7 +3107,7 @@
           <a:p>
             <a:fld id="{F818736A-FFF0-2D46-A8E8-BE11000C3203}" type="slidenum">
               <a:rPr lang="en-GB" smtClean="0"/>
-              <a:t>‹#›</a:t>
+              <a:t>‹Nr.›</a:t>
             </a:fld>
             <a:endParaRPr lang="en-GB"/>
           </a:p>
@@ -3009,7 +3278,7 @@
           <a:p>
             <a:fld id="{70A666A6-2FAB-D348-B19D-8A510A298A73}" type="datetimeFigureOut">
               <a:rPr lang="en-GB" smtClean="0"/>
-              <a:t>21/01/2021</a:t>
+              <a:t>28/04/2021</a:t>
             </a:fld>
             <a:endParaRPr lang="en-GB"/>
           </a:p>
@@ -3087,7 +3356,7 @@
           <a:p>
             <a:fld id="{F818736A-FFF0-2D46-A8E8-BE11000C3203}" type="slidenum">
               <a:rPr lang="en-GB" smtClean="0"/>
-              <a:t>‹#›</a:t>
+              <a:t>‹Nr.›</a:t>
             </a:fld>
             <a:endParaRPr lang="en-GB"/>
           </a:p>
@@ -3113,6 +3382,7 @@
     <p:sldLayoutId id="2147483693" r:id="rId9"/>
     <p:sldLayoutId id="2147483694" r:id="rId10"/>
     <p:sldLayoutId id="2147483695" r:id="rId11"/>
+    <p:sldLayoutId id="2147483696" r:id="rId12"/>
   </p:sldLayoutIdLst>
   <p:txStyles>
     <p:titleStyle>
@@ -3533,13 +3803,18 @@
           <a:p>
             <a:pPr algn="ctr"/>
             <a:r>
-              <a:rPr lang="en-GB" sz="2400" b="1" dirty="0">
+              <a:rPr lang="en-GB" sz="2400" b="1" dirty="0" err="1">
                 <a:latin typeface="Helvetica Neue" panose="02000503000000020004" pitchFamily="2" charset="0"/>
                 <a:ea typeface="Helvetica Neue" panose="02000503000000020004" pitchFamily="2" charset="0"/>
                 <a:cs typeface="Helvetica Neue" panose="02000503000000020004" pitchFamily="2" charset="0"/>
               </a:rPr>
-              <a:t>Frame</a:t>
-            </a:r>
+              <a:t>PointCloud</a:t>
+            </a:r>
+            <a:endParaRPr lang="en-GB" sz="2400" b="1" dirty="0">
+              <a:latin typeface="Helvetica Neue" panose="02000503000000020004" pitchFamily="2" charset="0"/>
+              <a:ea typeface="Helvetica Neue" panose="02000503000000020004" pitchFamily="2" charset="0"/>
+              <a:cs typeface="Helvetica Neue" panose="02000503000000020004" pitchFamily="2" charset="0"/>
+            </a:endParaRPr>
           </a:p>
           <a:p>
             <a:pPr algn="ctr"/>
@@ -3676,8 +3951,8 @@
         </p:nvSpPr>
         <p:spPr>
           <a:xfrm>
-            <a:off x="8203759" y="2349444"/>
-            <a:ext cx="656804" cy="640800"/>
+            <a:off x="8203758" y="2349444"/>
+            <a:ext cx="795779" cy="640800"/>
           </a:xfrm>
           <a:prstGeom prst="rect">
             <a:avLst/>
@@ -3806,8 +4081,8 @@
         </p:nvCxnSpPr>
         <p:spPr>
           <a:xfrm flipV="1">
-            <a:off x="7439429" y="2669847"/>
-            <a:ext cx="764330" cy="11135"/>
+            <a:off x="7439432" y="2669844"/>
+            <a:ext cx="764326" cy="11138"/>
           </a:xfrm>
           <a:prstGeom prst="straightConnector1">
             <a:avLst/>
@@ -3883,13 +4158,18 @@
           <a:p>
             <a:pPr algn="ctr"/>
             <a:r>
-              <a:rPr lang="en-GB" sz="2400" b="1" dirty="0">
+              <a:rPr lang="en-GB" sz="2400" b="1" dirty="0" err="1">
                 <a:latin typeface="Helvetica Neue" panose="02000503000000020004" pitchFamily="2" charset="0"/>
                 <a:ea typeface="Helvetica Neue" panose="02000503000000020004" pitchFamily="2" charset="0"/>
                 <a:cs typeface="Helvetica Neue" panose="02000503000000020004" pitchFamily="2" charset="0"/>
               </a:rPr>
-              <a:t>Frame</a:t>
-            </a:r>
+              <a:t>PointCloud</a:t>
+            </a:r>
+            <a:endParaRPr lang="en-GB" sz="2400" b="1" dirty="0">
+              <a:latin typeface="Helvetica Neue" panose="02000503000000020004" pitchFamily="2" charset="0"/>
+              <a:ea typeface="Helvetica Neue" panose="02000503000000020004" pitchFamily="2" charset="0"/>
+              <a:cs typeface="Helvetica Neue" panose="02000503000000020004" pitchFamily="2" charset="0"/>
+            </a:endParaRPr>
           </a:p>
         </p:txBody>
       </p:sp>
@@ -3942,13 +4222,18 @@
           <a:p>
             <a:pPr algn="ctr"/>
             <a:r>
-              <a:rPr lang="en-GB" sz="2400" b="1" dirty="0">
+              <a:rPr lang="en-GB" sz="2400" b="1" dirty="0" err="1">
                 <a:latin typeface="Helvetica Neue" panose="02000503000000020004" pitchFamily="2" charset="0"/>
                 <a:ea typeface="Helvetica Neue" panose="02000503000000020004" pitchFamily="2" charset="0"/>
                 <a:cs typeface="Helvetica Neue" panose="02000503000000020004" pitchFamily="2" charset="0"/>
               </a:rPr>
-              <a:t>Frame</a:t>
-            </a:r>
+              <a:t>PointCloud</a:t>
+            </a:r>
+            <a:endParaRPr lang="en-GB" sz="2400" b="1" dirty="0">
+              <a:latin typeface="Helvetica Neue" panose="02000503000000020004" pitchFamily="2" charset="0"/>
+              <a:ea typeface="Helvetica Neue" panose="02000503000000020004" pitchFamily="2" charset="0"/>
+              <a:cs typeface="Helvetica Neue" panose="02000503000000020004" pitchFamily="2" charset="0"/>
+            </a:endParaRPr>
           </a:p>
         </p:txBody>
       </p:sp>
@@ -4206,8 +4491,8 @@
         </p:nvCxnSpPr>
         <p:spPr>
           <a:xfrm>
-            <a:off x="6335624" y="1091512"/>
-            <a:ext cx="6353" cy="372799"/>
+            <a:off x="6341975" y="1044637"/>
+            <a:ext cx="2" cy="419674"/>
           </a:xfrm>
           <a:prstGeom prst="straightConnector1">
             <a:avLst/>
@@ -4582,10 +4867,10 @@
         </p:nvGrpSpPr>
         <p:grpSpPr>
           <a:xfrm>
-            <a:off x="5644696" y="234529"/>
-            <a:ext cx="1449427" cy="856980"/>
-            <a:chOff x="6695345" y="754681"/>
-            <a:chExt cx="1449427" cy="856980"/>
+            <a:off x="5370671" y="164949"/>
+            <a:ext cx="2009845" cy="879688"/>
+            <a:chOff x="6500423" y="685101"/>
+            <a:chExt cx="1429685" cy="879688"/>
           </a:xfrm>
         </p:grpSpPr>
         <p:sp>
@@ -4602,7 +4887,7 @@
           </p:nvSpPr>
           <p:spPr>
             <a:xfrm>
-              <a:off x="6695345" y="754681"/>
+              <a:off x="6500423" y="707809"/>
               <a:ext cx="1381855" cy="856980"/>
             </a:xfrm>
             <a:prstGeom prst="rect">
@@ -4721,7 +5006,7 @@
           </p:blipFill>
           <p:spPr bwMode="auto">
             <a:xfrm>
-              <a:off x="7637900" y="764620"/>
+              <a:off x="7423236" y="685101"/>
               <a:ext cx="506872" cy="764294"/>
             </a:xfrm>
             <a:prstGeom prst="rect">
@@ -4802,7 +5087,7 @@
         <p:spPr>
           <a:xfrm>
             <a:off x="2384099" y="997963"/>
-            <a:ext cx="1940235" cy="359749"/>
+            <a:ext cx="2174552" cy="359749"/>
           </a:xfrm>
           <a:prstGeom prst="rect">
             <a:avLst/>
@@ -4839,7 +5124,7 @@
                 </a:solidFill>
                 <a:latin typeface="American Typewriter" panose="02090604020004020304" pitchFamily="18" charset="77"/>
               </a:rPr>
-              <a:t>PyMultiLidar</a:t>
+              <a:t>pointcloudset</a:t>
             </a:r>
             <a:endParaRPr lang="en-GB" dirty="0">
               <a:solidFill>
@@ -4864,6 +5149,2280 @@
     <p:extLst>
       <p:ext uri="{BB962C8B-B14F-4D97-AF65-F5344CB8AC3E}">
         <p14:creationId xmlns:p14="http://schemas.microsoft.com/office/powerpoint/2010/main" val="2458420852"/>
+      </p:ext>
+    </p:extLst>
+  </p:cSld>
+  <p:clrMapOvr>
+    <a:masterClrMapping/>
+  </p:clrMapOvr>
+</p:sld>
+</file>
+
+<file path=ppt/slides/slide2.xml><?xml version="1.0" encoding="utf-8"?>
+<p:sld xmlns:a="http://schemas.openxmlformats.org/drawingml/2006/main" xmlns:r="http://schemas.openxmlformats.org/officeDocument/2006/relationships" xmlns:p="http://schemas.openxmlformats.org/presentationml/2006/main">
+  <p:cSld>
+    <p:spTree>
+      <p:nvGrpSpPr>
+        <p:cNvPr id="1" name=""/>
+        <p:cNvGrpSpPr/>
+        <p:nvPr/>
+      </p:nvGrpSpPr>
+      <p:grpSpPr>
+        <a:xfrm>
+          <a:off x="0" y="0"/>
+          <a:ext cx="0" cy="0"/>
+          <a:chOff x="0" y="0"/>
+          <a:chExt cx="0" cy="0"/>
+        </a:xfrm>
+      </p:grpSpPr>
+      <p:sp>
+        <p:nvSpPr>
+          <p:cNvPr id="9" name="Rechteck 2">
+            <a:extLst>
+              <a:ext uri="{FF2B5EF4-FFF2-40B4-BE49-F238E27FC236}">
+                <a16:creationId xmlns:a16="http://schemas.microsoft.com/office/drawing/2014/main" id="{A9C04879-7E7D-EC4B-8BFE-A3FF320A2165}"/>
+              </a:ext>
+            </a:extLst>
+          </p:cNvPr>
+          <p:cNvSpPr/>
+          <p:nvPr/>
+        </p:nvSpPr>
+        <p:spPr>
+          <a:xfrm>
+            <a:off x="1064175" y="1047849"/>
+            <a:ext cx="646558" cy="483810"/>
+          </a:xfrm>
+          <a:prstGeom prst="rect">
+            <a:avLst/>
+          </a:prstGeom>
+        </p:spPr>
+        <p:style>
+          <a:lnRef idx="2">
+            <a:schemeClr val="accent6">
+              <a:shade val="50000"/>
+            </a:schemeClr>
+          </a:lnRef>
+          <a:fillRef idx="1">
+            <a:schemeClr val="accent6"/>
+          </a:fillRef>
+          <a:effectRef idx="0">
+            <a:schemeClr val="accent6"/>
+          </a:effectRef>
+          <a:fontRef idx="minor">
+            <a:schemeClr val="lt1"/>
+          </a:fontRef>
+        </p:style>
+        <p:txBody>
+          <a:bodyPr rtlCol="0" anchor="ctr"/>
+          <a:lstStyle/>
+          <a:p>
+            <a:pPr algn="ctr"/>
+            <a:r>
+              <a:rPr lang="de-DE" sz="1028" dirty="0"/>
+              <a:t>ROS</a:t>
+            </a:r>
+          </a:p>
+          <a:p>
+            <a:pPr algn="ctr"/>
+            <a:r>
+              <a:rPr lang="de-DE" sz="1028" dirty="0"/>
+              <a:t>.</a:t>
+            </a:r>
+            <a:r>
+              <a:rPr lang="en-US" sz="1028" dirty="0"/>
+              <a:t>bag</a:t>
+            </a:r>
+          </a:p>
+        </p:txBody>
+      </p:sp>
+      <p:sp>
+        <p:nvSpPr>
+          <p:cNvPr id="11" name="Rechteck 4">
+            <a:extLst>
+              <a:ext uri="{FF2B5EF4-FFF2-40B4-BE49-F238E27FC236}">
+                <a16:creationId xmlns:a16="http://schemas.microsoft.com/office/drawing/2014/main" id="{80EF3979-53AE-5B4D-9124-C2542D2FD967}"/>
+              </a:ext>
+            </a:extLst>
+          </p:cNvPr>
+          <p:cNvSpPr/>
+          <p:nvPr/>
+        </p:nvSpPr>
+        <p:spPr>
+          <a:xfrm>
+            <a:off x="3972037" y="267719"/>
+            <a:ext cx="3937731" cy="2815875"/>
+          </a:xfrm>
+          <a:prstGeom prst="rect">
+            <a:avLst/>
+          </a:prstGeom>
+        </p:spPr>
+        <p:style>
+          <a:lnRef idx="2">
+            <a:schemeClr val="accent1">
+              <a:shade val="50000"/>
+            </a:schemeClr>
+          </a:lnRef>
+          <a:fillRef idx="1">
+            <a:schemeClr val="accent1"/>
+          </a:fillRef>
+          <a:effectRef idx="0">
+            <a:schemeClr val="accent1"/>
+          </a:effectRef>
+          <a:fontRef idx="minor">
+            <a:schemeClr val="lt1"/>
+          </a:fontRef>
+        </p:style>
+        <p:txBody>
+          <a:bodyPr rtlCol="0" anchor="ctr"/>
+          <a:lstStyle/>
+          <a:p>
+            <a:pPr algn="ctr"/>
+            <a:endParaRPr lang="en-GB" sz="1028" dirty="0"/>
+          </a:p>
+        </p:txBody>
+      </p:sp>
+      <p:sp>
+        <p:nvSpPr>
+          <p:cNvPr id="13" name="Textfeld 6">
+            <a:extLst>
+              <a:ext uri="{FF2B5EF4-FFF2-40B4-BE49-F238E27FC236}">
+                <a16:creationId xmlns:a16="http://schemas.microsoft.com/office/drawing/2014/main" id="{B588F039-94D8-0D43-AE88-52F10CAD953A}"/>
+              </a:ext>
+            </a:extLst>
+          </p:cNvPr>
+          <p:cNvSpPr txBox="1"/>
+          <p:nvPr/>
+        </p:nvSpPr>
+        <p:spPr>
+          <a:xfrm>
+            <a:off x="5308743" y="311401"/>
+            <a:ext cx="1402473" cy="250518"/>
+          </a:xfrm>
+          <a:prstGeom prst="rect">
+            <a:avLst/>
+          </a:prstGeom>
+          <a:noFill/>
+        </p:spPr>
+        <p:txBody>
+          <a:bodyPr wrap="square" rtlCol="0">
+            <a:spAutoFit/>
+          </a:bodyPr>
+          <a:lstStyle/>
+          <a:p>
+            <a:r>
+              <a:rPr lang="en-US" sz="1028" dirty="0" err="1">
+                <a:solidFill>
+                  <a:schemeClr val="bg1"/>
+                </a:solidFill>
+              </a:rPr>
+              <a:t>pointcloudset.Dataset</a:t>
+            </a:r>
+            <a:endParaRPr lang="en-US" sz="1028" dirty="0">
+              <a:solidFill>
+                <a:schemeClr val="bg1"/>
+              </a:solidFill>
+            </a:endParaRPr>
+          </a:p>
+        </p:txBody>
+      </p:sp>
+      <p:sp>
+        <p:nvSpPr>
+          <p:cNvPr id="15" name="Rechteck 8">
+            <a:extLst>
+              <a:ext uri="{FF2B5EF4-FFF2-40B4-BE49-F238E27FC236}">
+                <a16:creationId xmlns:a16="http://schemas.microsoft.com/office/drawing/2014/main" id="{5CE385E4-DB8A-F94B-982E-E0F0D2C68653}"/>
+              </a:ext>
+            </a:extLst>
+          </p:cNvPr>
+          <p:cNvSpPr/>
+          <p:nvPr/>
+        </p:nvSpPr>
+        <p:spPr>
+          <a:xfrm>
+            <a:off x="4967434" y="988328"/>
+            <a:ext cx="534952" cy="435630"/>
+          </a:xfrm>
+          <a:prstGeom prst="rect">
+            <a:avLst/>
+          </a:prstGeom>
+        </p:spPr>
+        <p:style>
+          <a:lnRef idx="2">
+            <a:schemeClr val="accent4">
+              <a:shade val="50000"/>
+            </a:schemeClr>
+          </a:lnRef>
+          <a:fillRef idx="1">
+            <a:schemeClr val="accent4"/>
+          </a:fillRef>
+          <a:effectRef idx="0">
+            <a:schemeClr val="accent4"/>
+          </a:effectRef>
+          <a:fontRef idx="minor">
+            <a:schemeClr val="lt1"/>
+          </a:fontRef>
+        </p:style>
+        <p:txBody>
+          <a:bodyPr rtlCol="0" anchor="ctr"/>
+          <a:lstStyle/>
+          <a:p>
+            <a:pPr algn="ctr"/>
+            <a:r>
+              <a:rPr lang="de-DE" sz="1028" dirty="0"/>
+              <a:t>Point Cloud</a:t>
+            </a:r>
+            <a:endParaRPr lang="en-GB" sz="1028" dirty="0"/>
+          </a:p>
+        </p:txBody>
+      </p:sp>
+      <p:sp>
+        <p:nvSpPr>
+          <p:cNvPr id="16" name="Rechteck 9">
+            <a:extLst>
+              <a:ext uri="{FF2B5EF4-FFF2-40B4-BE49-F238E27FC236}">
+                <a16:creationId xmlns:a16="http://schemas.microsoft.com/office/drawing/2014/main" id="{B2907088-2686-E84B-B39A-D423FE11F85C}"/>
+              </a:ext>
+            </a:extLst>
+          </p:cNvPr>
+          <p:cNvSpPr/>
+          <p:nvPr/>
+        </p:nvSpPr>
+        <p:spPr>
+          <a:xfrm>
+            <a:off x="5566426" y="988328"/>
+            <a:ext cx="534952" cy="435630"/>
+          </a:xfrm>
+          <a:prstGeom prst="rect">
+            <a:avLst/>
+          </a:prstGeom>
+        </p:spPr>
+        <p:style>
+          <a:lnRef idx="2">
+            <a:schemeClr val="accent4">
+              <a:shade val="50000"/>
+            </a:schemeClr>
+          </a:lnRef>
+          <a:fillRef idx="1">
+            <a:schemeClr val="accent4"/>
+          </a:fillRef>
+          <a:effectRef idx="0">
+            <a:schemeClr val="accent4"/>
+          </a:effectRef>
+          <a:fontRef idx="minor">
+            <a:schemeClr val="lt1"/>
+          </a:fontRef>
+        </p:style>
+        <p:txBody>
+          <a:bodyPr rtlCol="0" anchor="ctr"/>
+          <a:lstStyle/>
+          <a:p>
+            <a:pPr algn="ctr"/>
+            <a:r>
+              <a:rPr lang="de-DE" sz="1028" dirty="0"/>
+              <a:t>Point Cloud</a:t>
+            </a:r>
+            <a:endParaRPr lang="en-GB" sz="1028" dirty="0"/>
+          </a:p>
+        </p:txBody>
+      </p:sp>
+      <p:sp>
+        <p:nvSpPr>
+          <p:cNvPr id="17" name="Rechteck 10">
+            <a:extLst>
+              <a:ext uri="{FF2B5EF4-FFF2-40B4-BE49-F238E27FC236}">
+                <a16:creationId xmlns:a16="http://schemas.microsoft.com/office/drawing/2014/main" id="{BAF1BFEF-A181-B042-899C-5B3C4E527938}"/>
+              </a:ext>
+            </a:extLst>
+          </p:cNvPr>
+          <p:cNvSpPr/>
+          <p:nvPr/>
+        </p:nvSpPr>
+        <p:spPr>
+          <a:xfrm>
+            <a:off x="6165419" y="988328"/>
+            <a:ext cx="534952" cy="435630"/>
+          </a:xfrm>
+          <a:prstGeom prst="rect">
+            <a:avLst/>
+          </a:prstGeom>
+        </p:spPr>
+        <p:style>
+          <a:lnRef idx="2">
+            <a:schemeClr val="accent4">
+              <a:shade val="50000"/>
+            </a:schemeClr>
+          </a:lnRef>
+          <a:fillRef idx="1">
+            <a:schemeClr val="accent4"/>
+          </a:fillRef>
+          <a:effectRef idx="0">
+            <a:schemeClr val="accent4"/>
+          </a:effectRef>
+          <a:fontRef idx="minor">
+            <a:schemeClr val="lt1"/>
+          </a:fontRef>
+        </p:style>
+        <p:txBody>
+          <a:bodyPr rtlCol="0" anchor="ctr"/>
+          <a:lstStyle/>
+          <a:p>
+            <a:pPr algn="ctr"/>
+            <a:r>
+              <a:rPr lang="de-DE" sz="1028" dirty="0"/>
+              <a:t>Point Cloud</a:t>
+            </a:r>
+            <a:endParaRPr lang="en-GB" sz="1028" dirty="0"/>
+          </a:p>
+        </p:txBody>
+      </p:sp>
+      <p:cxnSp>
+        <p:nvCxnSpPr>
+          <p:cNvPr id="20" name="Gerade Verbindung mit Pfeil 13">
+            <a:extLst>
+              <a:ext uri="{FF2B5EF4-FFF2-40B4-BE49-F238E27FC236}">
+                <a16:creationId xmlns:a16="http://schemas.microsoft.com/office/drawing/2014/main" id="{FFD1B820-A975-8649-88FD-2067A203E748}"/>
+              </a:ext>
+            </a:extLst>
+          </p:cNvPr>
+          <p:cNvCxnSpPr>
+            <a:cxnSpLocks/>
+            <a:stCxn id="9" idx="3"/>
+          </p:cNvCxnSpPr>
+          <p:nvPr/>
+        </p:nvCxnSpPr>
+        <p:spPr>
+          <a:xfrm>
+            <a:off x="1710733" y="1289754"/>
+            <a:ext cx="2281897" cy="0"/>
+          </a:xfrm>
+          <a:prstGeom prst="straightConnector1">
+            <a:avLst/>
+          </a:prstGeom>
+          <a:ln>
+            <a:tailEnd type="triangle"/>
+          </a:ln>
+        </p:spPr>
+        <p:style>
+          <a:lnRef idx="1">
+            <a:schemeClr val="accent1"/>
+          </a:lnRef>
+          <a:fillRef idx="0">
+            <a:schemeClr val="accent1"/>
+          </a:fillRef>
+          <a:effectRef idx="0">
+            <a:schemeClr val="accent1"/>
+          </a:effectRef>
+          <a:fontRef idx="minor">
+            <a:schemeClr val="tx1"/>
+          </a:fontRef>
+        </p:style>
+      </p:cxnSp>
+      <p:sp>
+        <p:nvSpPr>
+          <p:cNvPr id="26" name="Rechteck 2">
+            <a:extLst>
+              <a:ext uri="{FF2B5EF4-FFF2-40B4-BE49-F238E27FC236}">
+                <a16:creationId xmlns:a16="http://schemas.microsoft.com/office/drawing/2014/main" id="{A576A8D1-DC14-4FB6-AC96-46F8CBF3F855}"/>
+              </a:ext>
+            </a:extLst>
+          </p:cNvPr>
+          <p:cNvSpPr/>
+          <p:nvPr/>
+        </p:nvSpPr>
+        <p:spPr>
+          <a:xfrm>
+            <a:off x="2012141" y="1076308"/>
+            <a:ext cx="882806" cy="483810"/>
+          </a:xfrm>
+          <a:prstGeom prst="rect">
+            <a:avLst/>
+          </a:prstGeom>
+          <a:solidFill>
+            <a:schemeClr val="accent2">
+              <a:lumMod val="60000"/>
+              <a:lumOff val="40000"/>
+            </a:schemeClr>
+          </a:solidFill>
+        </p:spPr>
+        <p:style>
+          <a:lnRef idx="2">
+            <a:schemeClr val="accent6">
+              <a:shade val="50000"/>
+            </a:schemeClr>
+          </a:lnRef>
+          <a:fillRef idx="1">
+            <a:schemeClr val="accent6"/>
+          </a:fillRef>
+          <a:effectRef idx="0">
+            <a:schemeClr val="accent6"/>
+          </a:effectRef>
+          <a:fontRef idx="minor">
+            <a:schemeClr val="lt1"/>
+          </a:fontRef>
+        </p:style>
+        <p:txBody>
+          <a:bodyPr rtlCol="0" anchor="ctr"/>
+          <a:lstStyle/>
+          <a:p>
+            <a:pPr algn="ctr"/>
+            <a:r>
+              <a:rPr lang="de-DE" sz="1028" dirty="0"/>
+              <a:t>bag2dataset</a:t>
+            </a:r>
+          </a:p>
+          <a:p>
+            <a:pPr algn="ctr"/>
+            <a:r>
+              <a:rPr lang="en-GB" sz="1028" dirty="0"/>
+              <a:t>CLI tool</a:t>
+            </a:r>
+          </a:p>
+        </p:txBody>
+      </p:sp>
+      <p:pic>
+        <p:nvPicPr>
+          <p:cNvPr id="1026" name="Picture 2" descr="Images and Logos — Dask documentation">
+            <a:extLst>
+              <a:ext uri="{FF2B5EF4-FFF2-40B4-BE49-F238E27FC236}">
+                <a16:creationId xmlns:a16="http://schemas.microsoft.com/office/drawing/2014/main" id="{DC9100BB-CAFD-461F-8A6C-119F5D419D37}"/>
+              </a:ext>
+            </a:extLst>
+          </p:cNvPr>
+          <p:cNvPicPr>
+            <a:picLocks noChangeAspect="1" noChangeArrowheads="1"/>
+          </p:cNvPicPr>
+          <p:nvPr/>
+        </p:nvPicPr>
+        <p:blipFill>
+          <a:blip r:embed="rId2">
+            <a:extLst>
+              <a:ext uri="{28A0092B-C50C-407E-A947-70E740481C1C}">
+                <a14:useLocalDpi xmlns:a14="http://schemas.microsoft.com/office/drawing/2010/main" val="0"/>
+              </a:ext>
+            </a:extLst>
+          </a:blip>
+          <a:srcRect/>
+          <a:stretch>
+            <a:fillRect/>
+          </a:stretch>
+        </p:blipFill>
+        <p:spPr bwMode="auto">
+          <a:xfrm>
+            <a:off x="6737588" y="988328"/>
+            <a:ext cx="1158719" cy="435630"/>
+          </a:xfrm>
+          <a:prstGeom prst="rect">
+            <a:avLst/>
+          </a:prstGeom>
+          <a:noFill/>
+          <a:extLst>
+            <a:ext uri="{909E8E84-426E-40DD-AFC4-6F175D3DCCD1}">
+              <a14:hiddenFill xmlns:a14="http://schemas.microsoft.com/office/drawing/2010/main">
+                <a:solidFill>
+                  <a:srgbClr val="FFFFFF"/>
+                </a:solidFill>
+              </a14:hiddenFill>
+            </a:ext>
+          </a:extLst>
+        </p:spPr>
+      </p:pic>
+      <p:sp>
+        <p:nvSpPr>
+          <p:cNvPr id="29" name="Textfeld 28">
+            <a:extLst>
+              <a:ext uri="{FF2B5EF4-FFF2-40B4-BE49-F238E27FC236}">
+                <a16:creationId xmlns:a16="http://schemas.microsoft.com/office/drawing/2014/main" id="{4391D8B3-7FC4-48AB-908C-433E2983CB4B}"/>
+              </a:ext>
+            </a:extLst>
+          </p:cNvPr>
+          <p:cNvSpPr txBox="1"/>
+          <p:nvPr/>
+        </p:nvSpPr>
+        <p:spPr>
+          <a:xfrm>
+            <a:off x="2107727" y="2389505"/>
+            <a:ext cx="1487908" cy="250518"/>
+          </a:xfrm>
+          <a:prstGeom prst="rect">
+            <a:avLst/>
+          </a:prstGeom>
+          <a:noFill/>
+        </p:spPr>
+        <p:txBody>
+          <a:bodyPr wrap="none" rtlCol="0">
+            <a:spAutoFit/>
+          </a:bodyPr>
+          <a:lstStyle/>
+          <a:p>
+            <a:r>
+              <a:rPr lang="de-DE" sz="1000" dirty="0" err="1"/>
+              <a:t>Dataset.from_instance</a:t>
+            </a:r>
+            <a:r>
+              <a:rPr lang="de-DE" sz="1000" dirty="0"/>
+              <a:t>()</a:t>
+            </a:r>
+            <a:endParaRPr lang="en-GB" sz="1000" dirty="0"/>
+          </a:p>
+        </p:txBody>
+      </p:sp>
+      <p:sp>
+        <p:nvSpPr>
+          <p:cNvPr id="30" name="Textfeld 29">
+            <a:extLst>
+              <a:ext uri="{FF2B5EF4-FFF2-40B4-BE49-F238E27FC236}">
+                <a16:creationId xmlns:a16="http://schemas.microsoft.com/office/drawing/2014/main" id="{6336245E-4E55-466B-97CB-B54432435838}"/>
+              </a:ext>
+            </a:extLst>
+          </p:cNvPr>
+          <p:cNvSpPr txBox="1"/>
+          <p:nvPr/>
+        </p:nvSpPr>
+        <p:spPr>
+          <a:xfrm>
+            <a:off x="4102791" y="1109195"/>
+            <a:ext cx="423514" cy="250518"/>
+          </a:xfrm>
+          <a:prstGeom prst="rect">
+            <a:avLst/>
+          </a:prstGeom>
+          <a:noFill/>
+        </p:spPr>
+        <p:txBody>
+          <a:bodyPr wrap="none" rtlCol="0">
+            <a:spAutoFit/>
+          </a:bodyPr>
+          <a:lstStyle/>
+          <a:p>
+            <a:r>
+              <a:rPr lang="de-DE" sz="1028" dirty="0" err="1">
+                <a:solidFill>
+                  <a:schemeClr val="bg1"/>
+                </a:solidFill>
+              </a:rPr>
+              <a:t>data</a:t>
+            </a:r>
+            <a:endParaRPr lang="en-GB" sz="1028" dirty="0">
+              <a:solidFill>
+                <a:schemeClr val="bg1"/>
+              </a:solidFill>
+            </a:endParaRPr>
+          </a:p>
+        </p:txBody>
+      </p:sp>
+      <p:sp>
+        <p:nvSpPr>
+          <p:cNvPr id="33" name="Textfeld 32">
+            <a:extLst>
+              <a:ext uri="{FF2B5EF4-FFF2-40B4-BE49-F238E27FC236}">
+                <a16:creationId xmlns:a16="http://schemas.microsoft.com/office/drawing/2014/main" id="{52BE4B38-7D42-4F37-A32F-AC15C0B6D049}"/>
+              </a:ext>
+            </a:extLst>
+          </p:cNvPr>
+          <p:cNvSpPr txBox="1"/>
+          <p:nvPr/>
+        </p:nvSpPr>
+        <p:spPr>
+          <a:xfrm>
+            <a:off x="4056761" y="1629765"/>
+            <a:ext cx="816249" cy="250518"/>
+          </a:xfrm>
+          <a:prstGeom prst="rect">
+            <a:avLst/>
+          </a:prstGeom>
+          <a:noFill/>
+        </p:spPr>
+        <p:txBody>
+          <a:bodyPr wrap="none" rtlCol="0">
+            <a:spAutoFit/>
+          </a:bodyPr>
+          <a:lstStyle/>
+          <a:p>
+            <a:r>
+              <a:rPr lang="de-DE" sz="1028" dirty="0" err="1">
+                <a:solidFill>
+                  <a:schemeClr val="bg1"/>
+                </a:solidFill>
+              </a:rPr>
+              <a:t>timestamps</a:t>
+            </a:r>
+            <a:endParaRPr lang="en-GB" sz="1028" dirty="0">
+              <a:solidFill>
+                <a:schemeClr val="bg1"/>
+              </a:solidFill>
+            </a:endParaRPr>
+          </a:p>
+        </p:txBody>
+      </p:sp>
+      <p:sp>
+        <p:nvSpPr>
+          <p:cNvPr id="31" name="Textfeld 30">
+            <a:extLst>
+              <a:ext uri="{FF2B5EF4-FFF2-40B4-BE49-F238E27FC236}">
+                <a16:creationId xmlns:a16="http://schemas.microsoft.com/office/drawing/2014/main" id="{2924C4C1-E460-420E-86E5-DA801F82B491}"/>
+              </a:ext>
+            </a:extLst>
+          </p:cNvPr>
+          <p:cNvSpPr txBox="1"/>
+          <p:nvPr/>
+        </p:nvSpPr>
+        <p:spPr>
+          <a:xfrm>
+            <a:off x="6667845" y="1672520"/>
+            <a:ext cx="753732" cy="250518"/>
+          </a:xfrm>
+          <a:prstGeom prst="rect">
+            <a:avLst/>
+          </a:prstGeom>
+          <a:noFill/>
+        </p:spPr>
+        <p:txBody>
+          <a:bodyPr wrap="none" rtlCol="0">
+            <a:spAutoFit/>
+          </a:bodyPr>
+          <a:lstStyle/>
+          <a:p>
+            <a:r>
+              <a:rPr lang="de-DE" sz="1028" dirty="0">
+                <a:solidFill>
+                  <a:schemeClr val="bg1"/>
+                </a:solidFill>
+              </a:rPr>
+              <a:t>[</a:t>
+            </a:r>
+            <a:r>
+              <a:rPr lang="de-DE" sz="1028" dirty="0" err="1">
+                <a:solidFill>
+                  <a:schemeClr val="bg1"/>
+                </a:solidFill>
+              </a:rPr>
+              <a:t>datetime</a:t>
+            </a:r>
+            <a:r>
+              <a:rPr lang="de-DE" sz="1028" dirty="0">
+                <a:solidFill>
+                  <a:schemeClr val="bg1"/>
+                </a:solidFill>
+              </a:rPr>
+              <a:t>]</a:t>
+            </a:r>
+            <a:endParaRPr lang="en-GB" sz="1028" dirty="0">
+              <a:solidFill>
+                <a:schemeClr val="bg1"/>
+              </a:solidFill>
+            </a:endParaRPr>
+          </a:p>
+        </p:txBody>
+      </p:sp>
+      <p:sp>
+        <p:nvSpPr>
+          <p:cNvPr id="35" name="Textfeld 34">
+            <a:extLst>
+              <a:ext uri="{FF2B5EF4-FFF2-40B4-BE49-F238E27FC236}">
+                <a16:creationId xmlns:a16="http://schemas.microsoft.com/office/drawing/2014/main" id="{DD3BDB17-74E1-4761-9899-4C061A7BFE2A}"/>
+              </a:ext>
+            </a:extLst>
+          </p:cNvPr>
+          <p:cNvSpPr txBox="1"/>
+          <p:nvPr/>
+        </p:nvSpPr>
+        <p:spPr>
+          <a:xfrm>
+            <a:off x="4077399" y="2295129"/>
+            <a:ext cx="463588" cy="250518"/>
+          </a:xfrm>
+          <a:prstGeom prst="rect">
+            <a:avLst/>
+          </a:prstGeom>
+          <a:noFill/>
+        </p:spPr>
+        <p:txBody>
+          <a:bodyPr wrap="none" rtlCol="0">
+            <a:spAutoFit/>
+          </a:bodyPr>
+          <a:lstStyle/>
+          <a:p>
+            <a:r>
+              <a:rPr lang="de-DE" sz="1028" dirty="0" err="1">
+                <a:solidFill>
+                  <a:schemeClr val="bg1"/>
+                </a:solidFill>
+              </a:rPr>
+              <a:t>meta</a:t>
+            </a:r>
+            <a:endParaRPr lang="en-GB" sz="1028" dirty="0">
+              <a:solidFill>
+                <a:schemeClr val="bg1"/>
+              </a:solidFill>
+            </a:endParaRPr>
+          </a:p>
+        </p:txBody>
+      </p:sp>
+      <p:sp>
+        <p:nvSpPr>
+          <p:cNvPr id="36" name="Textfeld 35">
+            <a:extLst>
+              <a:ext uri="{FF2B5EF4-FFF2-40B4-BE49-F238E27FC236}">
+                <a16:creationId xmlns:a16="http://schemas.microsoft.com/office/drawing/2014/main" id="{AD8692B1-02EC-47A5-9B68-651046D84908}"/>
+              </a:ext>
+            </a:extLst>
+          </p:cNvPr>
+          <p:cNvSpPr txBox="1"/>
+          <p:nvPr/>
+        </p:nvSpPr>
+        <p:spPr>
+          <a:xfrm>
+            <a:off x="6691730" y="2281589"/>
+            <a:ext cx="385042" cy="250518"/>
+          </a:xfrm>
+          <a:prstGeom prst="rect">
+            <a:avLst/>
+          </a:prstGeom>
+          <a:noFill/>
+        </p:spPr>
+        <p:txBody>
+          <a:bodyPr wrap="none" rtlCol="0">
+            <a:spAutoFit/>
+          </a:bodyPr>
+          <a:lstStyle/>
+          <a:p>
+            <a:r>
+              <a:rPr lang="de-DE" sz="1028" dirty="0" err="1">
+                <a:solidFill>
+                  <a:schemeClr val="bg1"/>
+                </a:solidFill>
+              </a:rPr>
+              <a:t>dict</a:t>
+            </a:r>
+            <a:endParaRPr lang="en-GB" sz="1028" dirty="0">
+              <a:solidFill>
+                <a:schemeClr val="bg1"/>
+              </a:solidFill>
+            </a:endParaRPr>
+          </a:p>
+        </p:txBody>
+      </p:sp>
+      <p:sp>
+        <p:nvSpPr>
+          <p:cNvPr id="32" name="Rectangle 5">
+            <a:extLst>
+              <a:ext uri="{FF2B5EF4-FFF2-40B4-BE49-F238E27FC236}">
+                <a16:creationId xmlns:a16="http://schemas.microsoft.com/office/drawing/2014/main" id="{2BE9B1F5-F36E-4726-99D2-CF9252BA7519}"/>
+              </a:ext>
+            </a:extLst>
+          </p:cNvPr>
+          <p:cNvSpPr>
+            <a:spLocks noChangeArrowheads="1"/>
+          </p:cNvSpPr>
+          <p:nvPr/>
+        </p:nvSpPr>
+        <p:spPr bwMode="auto">
+          <a:xfrm>
+            <a:off x="4966910" y="1580465"/>
+            <a:ext cx="1733460" cy="439264"/>
+          </a:xfrm>
+          <a:prstGeom prst="rect">
+            <a:avLst/>
+          </a:prstGeom>
+          <a:solidFill>
+            <a:srgbClr val="1E1E1E"/>
+          </a:solidFill>
+          <a:ln>
+            <a:noFill/>
+          </a:ln>
+          <a:effectLst/>
+          <a:extLst>
+            <a:ext uri="{91240B29-F687-4F45-9708-019B960494DF}">
+              <a14:hiddenLine xmlns:a14="http://schemas.microsoft.com/office/drawing/2010/main" w="9525">
+                <a:solidFill>
+                  <a:schemeClr val="tx1"/>
+                </a:solidFill>
+                <a:miter lim="800000"/>
+                <a:headEnd/>
+                <a:tailEnd/>
+              </a14:hiddenLine>
+            </a:ext>
+            <a:ext uri="{AF507438-7753-43E0-B8FC-AC1667EBCBE1}">
+              <a14:hiddenEffects xmlns:a14="http://schemas.microsoft.com/office/drawing/2010/main">
+                <a:effectLst>
+                  <a:outerShdw dist="35921" dir="2700000" algn="ctr" rotWithShape="0">
+                    <a:schemeClr val="bg2"/>
+                  </a:outerShdw>
+                </a:effectLst>
+              </a14:hiddenEffects>
+            </a:ext>
+          </a:extLst>
+        </p:spPr>
+        <p:txBody>
+          <a:bodyPr vert="horz" wrap="square" lIns="52238" tIns="26119" rIns="52238" bIns="26119" numCol="1" anchor="ctr" anchorCtr="0" compatLnSpc="1">
+            <a:prstTxWarp prst="textNoShape">
+              <a:avLst/>
+            </a:prstTxWarp>
+            <a:spAutoFit/>
+          </a:bodyPr>
+          <a:lstStyle/>
+          <a:p>
+            <a:pPr defTabSz="522397" eaLnBrk="0" fontAlgn="base" hangingPunct="0">
+              <a:spcBef>
+                <a:spcPct val="0"/>
+              </a:spcBef>
+              <a:spcAft>
+                <a:spcPct val="0"/>
+              </a:spcAft>
+            </a:pPr>
+            <a:r>
+              <a:rPr lang="en-US" altLang="en-US" sz="628" dirty="0">
+                <a:solidFill>
+                  <a:srgbClr val="D4D4D4"/>
+                </a:solidFill>
+                <a:latin typeface="var(--vscode-editor-font-family)"/>
+              </a:rPr>
+              <a:t>[</a:t>
+            </a:r>
+            <a:r>
+              <a:rPr lang="en-US" altLang="en-US" sz="628" dirty="0" err="1">
+                <a:solidFill>
+                  <a:srgbClr val="D4D4D4"/>
+                </a:solidFill>
+                <a:latin typeface="var(--vscode-editor-font-family)"/>
+              </a:rPr>
+              <a:t>datetime.datetime</a:t>
+            </a:r>
+            <a:r>
+              <a:rPr lang="en-US" altLang="en-US" sz="628" dirty="0">
+                <a:solidFill>
+                  <a:srgbClr val="D4D4D4"/>
+                </a:solidFill>
+                <a:latin typeface="var(--vscode-editor-font-family)"/>
+              </a:rPr>
+              <a:t>(2020, 12, 2, 10, 23, 48, 995642), </a:t>
+            </a:r>
+            <a:r>
+              <a:rPr lang="en-US" altLang="en-US" sz="628" dirty="0" err="1">
+                <a:solidFill>
+                  <a:srgbClr val="D4D4D4"/>
+                </a:solidFill>
+                <a:latin typeface="var(--vscode-editor-font-family)"/>
+              </a:rPr>
+              <a:t>datetime.datetime</a:t>
+            </a:r>
+            <a:r>
+              <a:rPr lang="en-US" altLang="en-US" sz="628" dirty="0">
+                <a:solidFill>
+                  <a:srgbClr val="D4D4D4"/>
+                </a:solidFill>
+                <a:latin typeface="var(--vscode-editor-font-family)"/>
+              </a:rPr>
+              <a:t>(2020, 12, 2, 10, 23, 49, 154242), </a:t>
+            </a:r>
+            <a:r>
+              <a:rPr lang="en-US" altLang="en-US" sz="628" dirty="0" err="1">
+                <a:solidFill>
+                  <a:srgbClr val="D4D4D4"/>
+                </a:solidFill>
+                <a:latin typeface="var(--vscode-editor-font-family)"/>
+              </a:rPr>
+              <a:t>datetime.datetime</a:t>
+            </a:r>
+            <a:r>
+              <a:rPr lang="en-US" altLang="en-US" sz="628" dirty="0">
+                <a:solidFill>
+                  <a:srgbClr val="D4D4D4"/>
+                </a:solidFill>
+                <a:latin typeface="var(--vscode-editor-font-family)"/>
+              </a:rPr>
+              <a:t>(2020, 12, 2, 10, 23, 49, 238166)] </a:t>
+            </a:r>
+            <a:endParaRPr lang="en-US" altLang="en-US" sz="628" dirty="0">
+              <a:latin typeface="Arial" panose="020B0604020202020204" pitchFamily="34" charset="0"/>
+            </a:endParaRPr>
+          </a:p>
+        </p:txBody>
+      </p:sp>
+      <p:sp>
+        <p:nvSpPr>
+          <p:cNvPr id="37" name="Rectangle 6">
+            <a:extLst>
+              <a:ext uri="{FF2B5EF4-FFF2-40B4-BE49-F238E27FC236}">
+                <a16:creationId xmlns:a16="http://schemas.microsoft.com/office/drawing/2014/main" id="{0E051D0E-5D82-46EA-86D3-C5B5081E4995}"/>
+              </a:ext>
+            </a:extLst>
+          </p:cNvPr>
+          <p:cNvSpPr>
+            <a:spLocks noChangeArrowheads="1"/>
+          </p:cNvSpPr>
+          <p:nvPr/>
+        </p:nvSpPr>
+        <p:spPr bwMode="auto">
+          <a:xfrm>
+            <a:off x="4967434" y="2245800"/>
+            <a:ext cx="1732936" cy="422080"/>
+          </a:xfrm>
+          <a:prstGeom prst="rect">
+            <a:avLst/>
+          </a:prstGeom>
+          <a:solidFill>
+            <a:srgbClr val="1E1E1E"/>
+          </a:solidFill>
+          <a:ln>
+            <a:noFill/>
+          </a:ln>
+          <a:effectLst/>
+          <a:extLst>
+            <a:ext uri="{91240B29-F687-4F45-9708-019B960494DF}">
+              <a14:hiddenLine xmlns:a14="http://schemas.microsoft.com/office/drawing/2010/main" w="9525">
+                <a:solidFill>
+                  <a:schemeClr val="tx1"/>
+                </a:solidFill>
+                <a:miter lim="800000"/>
+                <a:headEnd/>
+                <a:tailEnd/>
+              </a14:hiddenLine>
+            </a:ext>
+            <a:ext uri="{AF507438-7753-43E0-B8FC-AC1667EBCBE1}">
+              <a14:hiddenEffects xmlns:a14="http://schemas.microsoft.com/office/drawing/2010/main">
+                <a:effectLst>
+                  <a:outerShdw dist="35921" dir="2700000" algn="ctr" rotWithShape="0">
+                    <a:schemeClr val="bg2"/>
+                  </a:outerShdw>
+                </a:effectLst>
+              </a14:hiddenEffects>
+            </a:ext>
+          </a:extLst>
+        </p:spPr>
+        <p:txBody>
+          <a:bodyPr vert="horz" wrap="square" lIns="52238" tIns="26119" rIns="52238" bIns="26119" numCol="1" anchor="ctr" anchorCtr="0" compatLnSpc="1">
+            <a:prstTxWarp prst="textNoShape">
+              <a:avLst/>
+            </a:prstTxWarp>
+            <a:spAutoFit/>
+          </a:bodyPr>
+          <a:lstStyle/>
+          <a:p>
+            <a:pPr defTabSz="522397" eaLnBrk="0" fontAlgn="base" hangingPunct="0">
+              <a:spcBef>
+                <a:spcPct val="0"/>
+              </a:spcBef>
+              <a:spcAft>
+                <a:spcPct val="0"/>
+              </a:spcAft>
+            </a:pPr>
+            <a:r>
+              <a:rPr lang="en-US" altLang="en-US" sz="800" dirty="0">
+                <a:solidFill>
+                  <a:srgbClr val="D4D4D4"/>
+                </a:solidFill>
+                <a:latin typeface="var(--vscode-editor-font-family)"/>
+              </a:rPr>
+              <a:t>{'</a:t>
+            </a:r>
+            <a:r>
+              <a:rPr lang="en-US" altLang="en-US" sz="800" dirty="0" err="1">
+                <a:solidFill>
+                  <a:srgbClr val="D4D4D4"/>
+                </a:solidFill>
+                <a:latin typeface="var(--vscode-editor-font-family)"/>
+              </a:rPr>
+              <a:t>orig_file</a:t>
+            </a:r>
+            <a:r>
+              <a:rPr lang="en-US" altLang="en-US" sz="800" dirty="0">
+                <a:solidFill>
+                  <a:srgbClr val="D4D4D4"/>
+                </a:solidFill>
+                <a:latin typeface="var(--vscode-editor-font-family)"/>
+              </a:rPr>
+              <a:t>': 'vib2_2020-12-02-11-22-46.bag', 'topic': '/os1_cloud_node/points'}</a:t>
+            </a:r>
+            <a:r>
+              <a:rPr lang="en-US" altLang="en-US" sz="800" dirty="0"/>
+              <a:t> </a:t>
+            </a:r>
+            <a:endParaRPr lang="en-US" altLang="en-US" sz="800" dirty="0">
+              <a:latin typeface="Arial" panose="020B0604020202020204" pitchFamily="34" charset="0"/>
+            </a:endParaRPr>
+          </a:p>
+        </p:txBody>
+      </p:sp>
+      <p:sp>
+        <p:nvSpPr>
+          <p:cNvPr id="48" name="Rechteck 2">
+            <a:extLst>
+              <a:ext uri="{FF2B5EF4-FFF2-40B4-BE49-F238E27FC236}">
+                <a16:creationId xmlns:a16="http://schemas.microsoft.com/office/drawing/2014/main" id="{C8A76C31-0B47-494F-91E0-259E3D722384}"/>
+              </a:ext>
+            </a:extLst>
+          </p:cNvPr>
+          <p:cNvSpPr/>
+          <p:nvPr/>
+        </p:nvSpPr>
+        <p:spPr>
+          <a:xfrm>
+            <a:off x="1064985" y="297919"/>
+            <a:ext cx="646558" cy="483810"/>
+          </a:xfrm>
+          <a:prstGeom prst="rect">
+            <a:avLst/>
+          </a:prstGeom>
+        </p:spPr>
+        <p:style>
+          <a:lnRef idx="2">
+            <a:schemeClr val="accent6">
+              <a:shade val="50000"/>
+            </a:schemeClr>
+          </a:lnRef>
+          <a:fillRef idx="1">
+            <a:schemeClr val="accent6"/>
+          </a:fillRef>
+          <a:effectRef idx="0">
+            <a:schemeClr val="accent6"/>
+          </a:effectRef>
+          <a:fontRef idx="minor">
+            <a:schemeClr val="lt1"/>
+          </a:fontRef>
+        </p:style>
+        <p:txBody>
+          <a:bodyPr rtlCol="0" anchor="ctr"/>
+          <a:lstStyle/>
+          <a:p>
+            <a:pPr algn="ctr"/>
+            <a:r>
+              <a:rPr lang="de-DE" sz="1028" dirty="0" err="1"/>
+              <a:t>stored</a:t>
+            </a:r>
+            <a:r>
+              <a:rPr lang="de-DE" sz="1028" dirty="0"/>
+              <a:t> Dataset</a:t>
+            </a:r>
+            <a:endParaRPr lang="en-GB" sz="1028" dirty="0"/>
+          </a:p>
+        </p:txBody>
+      </p:sp>
+      <p:cxnSp>
+        <p:nvCxnSpPr>
+          <p:cNvPr id="24" name="Gerade Verbindung mit Pfeil 23">
+            <a:extLst>
+              <a:ext uri="{FF2B5EF4-FFF2-40B4-BE49-F238E27FC236}">
+                <a16:creationId xmlns:a16="http://schemas.microsoft.com/office/drawing/2014/main" id="{DC5F5FE2-F355-4EED-BB0F-BE46E1C17331}"/>
+              </a:ext>
+            </a:extLst>
+          </p:cNvPr>
+          <p:cNvCxnSpPr>
+            <a:stCxn id="48" idx="3"/>
+          </p:cNvCxnSpPr>
+          <p:nvPr/>
+        </p:nvCxnSpPr>
+        <p:spPr>
+          <a:xfrm>
+            <a:off x="1711543" y="539824"/>
+            <a:ext cx="2260494" cy="0"/>
+          </a:xfrm>
+          <a:prstGeom prst="straightConnector1">
+            <a:avLst/>
+          </a:prstGeom>
+          <a:ln>
+            <a:tailEnd type="triangle"/>
+          </a:ln>
+        </p:spPr>
+        <p:style>
+          <a:lnRef idx="1">
+            <a:schemeClr val="accent1"/>
+          </a:lnRef>
+          <a:fillRef idx="0">
+            <a:schemeClr val="accent1"/>
+          </a:fillRef>
+          <a:effectRef idx="0">
+            <a:schemeClr val="accent1"/>
+          </a:effectRef>
+          <a:fontRef idx="minor">
+            <a:schemeClr val="tx1"/>
+          </a:fontRef>
+        </p:style>
+      </p:cxnSp>
+      <p:sp>
+        <p:nvSpPr>
+          <p:cNvPr id="49" name="Rechteck 2">
+            <a:extLst>
+              <a:ext uri="{FF2B5EF4-FFF2-40B4-BE49-F238E27FC236}">
+                <a16:creationId xmlns:a16="http://schemas.microsoft.com/office/drawing/2014/main" id="{32DF45BC-7821-437D-8FCC-760D3F3A5AD5}"/>
+              </a:ext>
+            </a:extLst>
+          </p:cNvPr>
+          <p:cNvSpPr/>
+          <p:nvPr/>
+        </p:nvSpPr>
+        <p:spPr>
+          <a:xfrm>
+            <a:off x="1055978" y="1797779"/>
+            <a:ext cx="646558" cy="483810"/>
+          </a:xfrm>
+          <a:prstGeom prst="rect">
+            <a:avLst/>
+          </a:prstGeom>
+        </p:spPr>
+        <p:style>
+          <a:lnRef idx="2">
+            <a:schemeClr val="accent6">
+              <a:shade val="50000"/>
+            </a:schemeClr>
+          </a:lnRef>
+          <a:fillRef idx="1">
+            <a:schemeClr val="accent6"/>
+          </a:fillRef>
+          <a:effectRef idx="0">
+            <a:schemeClr val="accent6"/>
+          </a:effectRef>
+          <a:fontRef idx="minor">
+            <a:schemeClr val="lt1"/>
+          </a:fontRef>
+        </p:style>
+        <p:txBody>
+          <a:bodyPr rtlCol="0" anchor="ctr"/>
+          <a:lstStyle/>
+          <a:p>
+            <a:pPr algn="ctr"/>
+            <a:r>
+              <a:rPr lang="de-DE" sz="1028" dirty="0"/>
+              <a:t>ROS</a:t>
+            </a:r>
+          </a:p>
+          <a:p>
+            <a:pPr algn="ctr"/>
+            <a:r>
+              <a:rPr lang="de-DE" sz="1028" dirty="0"/>
+              <a:t>.</a:t>
+            </a:r>
+            <a:r>
+              <a:rPr lang="de-DE" sz="1028" dirty="0" err="1"/>
+              <a:t>bag</a:t>
+            </a:r>
+            <a:endParaRPr lang="en-GB" sz="1028" dirty="0"/>
+          </a:p>
+        </p:txBody>
+      </p:sp>
+      <p:sp>
+        <p:nvSpPr>
+          <p:cNvPr id="50" name="Rechteck 2">
+            <a:extLst>
+              <a:ext uri="{FF2B5EF4-FFF2-40B4-BE49-F238E27FC236}">
+                <a16:creationId xmlns:a16="http://schemas.microsoft.com/office/drawing/2014/main" id="{E42CC7B8-B30B-4298-991A-20A482DF9E75}"/>
+              </a:ext>
+            </a:extLst>
+          </p:cNvPr>
+          <p:cNvSpPr/>
+          <p:nvPr/>
+        </p:nvSpPr>
+        <p:spPr>
+          <a:xfrm>
+            <a:off x="3104763" y="1056540"/>
+            <a:ext cx="646558" cy="483810"/>
+          </a:xfrm>
+          <a:prstGeom prst="rect">
+            <a:avLst/>
+          </a:prstGeom>
+        </p:spPr>
+        <p:style>
+          <a:lnRef idx="2">
+            <a:schemeClr val="accent6">
+              <a:shade val="50000"/>
+            </a:schemeClr>
+          </a:lnRef>
+          <a:fillRef idx="1">
+            <a:schemeClr val="accent6"/>
+          </a:fillRef>
+          <a:effectRef idx="0">
+            <a:schemeClr val="accent6"/>
+          </a:effectRef>
+          <a:fontRef idx="minor">
+            <a:schemeClr val="lt1"/>
+          </a:fontRef>
+        </p:style>
+        <p:txBody>
+          <a:bodyPr rtlCol="0" anchor="ctr"/>
+          <a:lstStyle/>
+          <a:p>
+            <a:pPr algn="ctr"/>
+            <a:r>
+              <a:rPr lang="de-DE" sz="1028" dirty="0" err="1"/>
+              <a:t>stored</a:t>
+            </a:r>
+            <a:r>
+              <a:rPr lang="de-DE" sz="1028" dirty="0"/>
+              <a:t> Dataset</a:t>
+            </a:r>
+            <a:endParaRPr lang="en-GB" sz="1028" dirty="0"/>
+          </a:p>
+        </p:txBody>
+      </p:sp>
+      <p:sp>
+        <p:nvSpPr>
+          <p:cNvPr id="51" name="Textfeld 50">
+            <a:extLst>
+              <a:ext uri="{FF2B5EF4-FFF2-40B4-BE49-F238E27FC236}">
+                <a16:creationId xmlns:a16="http://schemas.microsoft.com/office/drawing/2014/main" id="{347C2E79-1029-4B15-BE93-338C9131B717}"/>
+              </a:ext>
+            </a:extLst>
+          </p:cNvPr>
+          <p:cNvSpPr txBox="1"/>
+          <p:nvPr/>
+        </p:nvSpPr>
+        <p:spPr>
+          <a:xfrm>
+            <a:off x="2094518" y="275571"/>
+            <a:ext cx="1205779" cy="250518"/>
+          </a:xfrm>
+          <a:prstGeom prst="rect">
+            <a:avLst/>
+          </a:prstGeom>
+          <a:noFill/>
+        </p:spPr>
+        <p:txBody>
+          <a:bodyPr wrap="none" rtlCol="0">
+            <a:spAutoFit/>
+          </a:bodyPr>
+          <a:lstStyle/>
+          <a:p>
+            <a:r>
+              <a:rPr lang="de-DE" sz="1000" dirty="0" err="1"/>
+              <a:t>Dataset.from_file</a:t>
+            </a:r>
+            <a:r>
+              <a:rPr lang="de-DE" sz="1000" dirty="0"/>
+              <a:t>()</a:t>
+            </a:r>
+            <a:endParaRPr lang="en-GB" sz="1000" dirty="0"/>
+          </a:p>
+        </p:txBody>
+      </p:sp>
+      <p:cxnSp>
+        <p:nvCxnSpPr>
+          <p:cNvPr id="52" name="Gerade Verbindung mit Pfeil 51">
+            <a:extLst>
+              <a:ext uri="{FF2B5EF4-FFF2-40B4-BE49-F238E27FC236}">
+                <a16:creationId xmlns:a16="http://schemas.microsoft.com/office/drawing/2014/main" id="{D35A84B6-18F7-4B47-9E91-C50D39C87979}"/>
+              </a:ext>
+            </a:extLst>
+          </p:cNvPr>
+          <p:cNvCxnSpPr/>
+          <p:nvPr/>
+        </p:nvCxnSpPr>
+        <p:spPr>
+          <a:xfrm>
+            <a:off x="1710733" y="2049348"/>
+            <a:ext cx="2260494" cy="0"/>
+          </a:xfrm>
+          <a:prstGeom prst="straightConnector1">
+            <a:avLst/>
+          </a:prstGeom>
+          <a:ln>
+            <a:tailEnd type="triangle"/>
+          </a:ln>
+        </p:spPr>
+        <p:style>
+          <a:lnRef idx="1">
+            <a:schemeClr val="accent1"/>
+          </a:lnRef>
+          <a:fillRef idx="0">
+            <a:schemeClr val="accent1"/>
+          </a:fillRef>
+          <a:effectRef idx="0">
+            <a:schemeClr val="accent1"/>
+          </a:effectRef>
+          <a:fontRef idx="minor">
+            <a:schemeClr val="tx1"/>
+          </a:fontRef>
+        </p:style>
+      </p:cxnSp>
+      <p:sp>
+        <p:nvSpPr>
+          <p:cNvPr id="54" name="Rechteck 7">
+            <a:extLst>
+              <a:ext uri="{FF2B5EF4-FFF2-40B4-BE49-F238E27FC236}">
+                <a16:creationId xmlns:a16="http://schemas.microsoft.com/office/drawing/2014/main" id="{9704CEBF-BAFC-4DE2-92E1-84DB120FF15D}"/>
+              </a:ext>
+            </a:extLst>
+          </p:cNvPr>
+          <p:cNvSpPr/>
+          <p:nvPr/>
+        </p:nvSpPr>
+        <p:spPr>
+          <a:xfrm>
+            <a:off x="450935" y="2458763"/>
+            <a:ext cx="534952" cy="435630"/>
+          </a:xfrm>
+          <a:prstGeom prst="rect">
+            <a:avLst/>
+          </a:prstGeom>
+        </p:spPr>
+        <p:style>
+          <a:lnRef idx="2">
+            <a:schemeClr val="accent4">
+              <a:shade val="50000"/>
+            </a:schemeClr>
+          </a:lnRef>
+          <a:fillRef idx="1">
+            <a:schemeClr val="accent4"/>
+          </a:fillRef>
+          <a:effectRef idx="0">
+            <a:schemeClr val="accent4"/>
+          </a:effectRef>
+          <a:fontRef idx="minor">
+            <a:schemeClr val="lt1"/>
+          </a:fontRef>
+        </p:style>
+        <p:txBody>
+          <a:bodyPr rtlCol="0" anchor="ctr"/>
+          <a:lstStyle/>
+          <a:p>
+            <a:pPr algn="ctr"/>
+            <a:r>
+              <a:rPr lang="de-DE" sz="1028" dirty="0"/>
+              <a:t>Point Cloud</a:t>
+            </a:r>
+            <a:endParaRPr lang="en-GB" sz="1028" dirty="0"/>
+          </a:p>
+        </p:txBody>
+      </p:sp>
+      <p:sp>
+        <p:nvSpPr>
+          <p:cNvPr id="55" name="Rechteck 7">
+            <a:extLst>
+              <a:ext uri="{FF2B5EF4-FFF2-40B4-BE49-F238E27FC236}">
+                <a16:creationId xmlns:a16="http://schemas.microsoft.com/office/drawing/2014/main" id="{DA2AD21A-6A90-4584-9472-145962640365}"/>
+              </a:ext>
+            </a:extLst>
+          </p:cNvPr>
+          <p:cNvSpPr/>
+          <p:nvPr/>
+        </p:nvSpPr>
+        <p:spPr>
+          <a:xfrm>
+            <a:off x="1091047" y="2458763"/>
+            <a:ext cx="534952" cy="435630"/>
+          </a:xfrm>
+          <a:prstGeom prst="rect">
+            <a:avLst/>
+          </a:prstGeom>
+        </p:spPr>
+        <p:style>
+          <a:lnRef idx="2">
+            <a:schemeClr val="accent4">
+              <a:shade val="50000"/>
+            </a:schemeClr>
+          </a:lnRef>
+          <a:fillRef idx="1">
+            <a:schemeClr val="accent4"/>
+          </a:fillRef>
+          <a:effectRef idx="0">
+            <a:schemeClr val="accent4"/>
+          </a:effectRef>
+          <a:fontRef idx="minor">
+            <a:schemeClr val="lt1"/>
+          </a:fontRef>
+        </p:style>
+        <p:txBody>
+          <a:bodyPr rtlCol="0" anchor="ctr"/>
+          <a:lstStyle/>
+          <a:p>
+            <a:pPr algn="ctr"/>
+            <a:r>
+              <a:rPr lang="de-DE" sz="1028" dirty="0"/>
+              <a:t>Point Cloud</a:t>
+            </a:r>
+            <a:endParaRPr lang="en-GB" sz="1028" dirty="0"/>
+          </a:p>
+        </p:txBody>
+      </p:sp>
+      <p:sp>
+        <p:nvSpPr>
+          <p:cNvPr id="39" name="Textfeld 38">
+            <a:extLst>
+              <a:ext uri="{FF2B5EF4-FFF2-40B4-BE49-F238E27FC236}">
+                <a16:creationId xmlns:a16="http://schemas.microsoft.com/office/drawing/2014/main" id="{B76610C6-B2BA-4C60-BB74-3BFDDA3332EF}"/>
+              </a:ext>
+            </a:extLst>
+          </p:cNvPr>
+          <p:cNvSpPr txBox="1"/>
+          <p:nvPr/>
+        </p:nvSpPr>
+        <p:spPr>
+          <a:xfrm>
+            <a:off x="142259" y="2319711"/>
+            <a:ext cx="1821332" cy="646331"/>
+          </a:xfrm>
+          <a:prstGeom prst="rect">
+            <a:avLst/>
+          </a:prstGeom>
+          <a:noFill/>
+        </p:spPr>
+        <p:txBody>
+          <a:bodyPr wrap="none" rtlCol="0">
+            <a:spAutoFit/>
+          </a:bodyPr>
+          <a:lstStyle/>
+          <a:p>
+            <a:r>
+              <a:rPr lang="de-DE" sz="3600" dirty="0"/>
+              <a:t>[             ]</a:t>
+            </a:r>
+            <a:endParaRPr lang="en-GB" sz="3600" dirty="0"/>
+          </a:p>
+        </p:txBody>
+      </p:sp>
+      <p:sp>
+        <p:nvSpPr>
+          <p:cNvPr id="56" name="Textfeld 55">
+            <a:extLst>
+              <a:ext uri="{FF2B5EF4-FFF2-40B4-BE49-F238E27FC236}">
+                <a16:creationId xmlns:a16="http://schemas.microsoft.com/office/drawing/2014/main" id="{5908B713-2D16-4042-8940-72F5673B5BDB}"/>
+              </a:ext>
+            </a:extLst>
+          </p:cNvPr>
+          <p:cNvSpPr txBox="1"/>
+          <p:nvPr/>
+        </p:nvSpPr>
+        <p:spPr>
+          <a:xfrm>
+            <a:off x="412653" y="2910334"/>
+            <a:ext cx="1146468" cy="246221"/>
+          </a:xfrm>
+          <a:prstGeom prst="rect">
+            <a:avLst/>
+          </a:prstGeom>
+          <a:noFill/>
+        </p:spPr>
+        <p:txBody>
+          <a:bodyPr wrap="none" rtlCol="0">
+            <a:spAutoFit/>
+          </a:bodyPr>
+          <a:lstStyle/>
+          <a:p>
+            <a:r>
+              <a:rPr lang="de-DE" sz="1000" dirty="0"/>
+              <a:t>List </a:t>
+            </a:r>
+            <a:r>
+              <a:rPr lang="de-DE" sz="1000" dirty="0" err="1"/>
+              <a:t>of</a:t>
+            </a:r>
+            <a:r>
+              <a:rPr lang="de-DE" sz="1000" dirty="0"/>
+              <a:t> </a:t>
+            </a:r>
+            <a:r>
+              <a:rPr lang="de-DE" sz="1000" dirty="0" err="1"/>
+              <a:t>PointClouds</a:t>
+            </a:r>
+            <a:endParaRPr lang="en-GB" sz="1000" dirty="0"/>
+          </a:p>
+        </p:txBody>
+      </p:sp>
+      <p:cxnSp>
+        <p:nvCxnSpPr>
+          <p:cNvPr id="58" name="Gerade Verbindung mit Pfeil 57">
+            <a:extLst>
+              <a:ext uri="{FF2B5EF4-FFF2-40B4-BE49-F238E27FC236}">
+                <a16:creationId xmlns:a16="http://schemas.microsoft.com/office/drawing/2014/main" id="{620229BE-A8DA-4F9D-A18B-A335C1B22D5E}"/>
+              </a:ext>
+            </a:extLst>
+          </p:cNvPr>
+          <p:cNvCxnSpPr>
+            <a:cxnSpLocks/>
+          </p:cNvCxnSpPr>
+          <p:nvPr/>
+        </p:nvCxnSpPr>
+        <p:spPr>
+          <a:xfrm>
+            <a:off x="1792986" y="2676578"/>
+            <a:ext cx="2178241" cy="0"/>
+          </a:xfrm>
+          <a:prstGeom prst="straightConnector1">
+            <a:avLst/>
+          </a:prstGeom>
+          <a:ln>
+            <a:tailEnd type="triangle"/>
+          </a:ln>
+        </p:spPr>
+        <p:style>
+          <a:lnRef idx="1">
+            <a:schemeClr val="accent1"/>
+          </a:lnRef>
+          <a:fillRef idx="0">
+            <a:schemeClr val="accent1"/>
+          </a:fillRef>
+          <a:effectRef idx="0">
+            <a:schemeClr val="accent1"/>
+          </a:effectRef>
+          <a:fontRef idx="minor">
+            <a:schemeClr val="tx1"/>
+          </a:fontRef>
+        </p:style>
+      </p:cxnSp>
+      <p:sp>
+        <p:nvSpPr>
+          <p:cNvPr id="60" name="Textfeld 59">
+            <a:extLst>
+              <a:ext uri="{FF2B5EF4-FFF2-40B4-BE49-F238E27FC236}">
+                <a16:creationId xmlns:a16="http://schemas.microsoft.com/office/drawing/2014/main" id="{6955327D-E210-4C46-BE46-F733C959AF27}"/>
+              </a:ext>
+            </a:extLst>
+          </p:cNvPr>
+          <p:cNvSpPr txBox="1"/>
+          <p:nvPr/>
+        </p:nvSpPr>
+        <p:spPr>
+          <a:xfrm>
+            <a:off x="2094519" y="1787166"/>
+            <a:ext cx="1205779" cy="250518"/>
+          </a:xfrm>
+          <a:prstGeom prst="rect">
+            <a:avLst/>
+          </a:prstGeom>
+          <a:noFill/>
+        </p:spPr>
+        <p:txBody>
+          <a:bodyPr wrap="none" rtlCol="0">
+            <a:spAutoFit/>
+          </a:bodyPr>
+          <a:lstStyle/>
+          <a:p>
+            <a:r>
+              <a:rPr lang="de-DE" sz="1000" dirty="0" err="1"/>
+              <a:t>Dataset.from_file</a:t>
+            </a:r>
+            <a:r>
+              <a:rPr lang="de-DE" sz="1000" dirty="0"/>
+              <a:t>()</a:t>
+            </a:r>
+            <a:endParaRPr lang="en-GB" sz="1000" dirty="0"/>
+          </a:p>
+        </p:txBody>
+      </p:sp>
+      <p:sp>
+        <p:nvSpPr>
+          <p:cNvPr id="62" name="Rechteck 2">
+            <a:extLst>
+              <a:ext uri="{FF2B5EF4-FFF2-40B4-BE49-F238E27FC236}">
+                <a16:creationId xmlns:a16="http://schemas.microsoft.com/office/drawing/2014/main" id="{F484C540-C772-4A15-AC2C-090C3E6BBF41}"/>
+              </a:ext>
+            </a:extLst>
+          </p:cNvPr>
+          <p:cNvSpPr/>
+          <p:nvPr/>
+        </p:nvSpPr>
+        <p:spPr>
+          <a:xfrm>
+            <a:off x="8340300" y="1469840"/>
+            <a:ext cx="646558" cy="483810"/>
+          </a:xfrm>
+          <a:prstGeom prst="rect">
+            <a:avLst/>
+          </a:prstGeom>
+        </p:spPr>
+        <p:style>
+          <a:lnRef idx="2">
+            <a:schemeClr val="accent6">
+              <a:shade val="50000"/>
+            </a:schemeClr>
+          </a:lnRef>
+          <a:fillRef idx="1">
+            <a:schemeClr val="accent6"/>
+          </a:fillRef>
+          <a:effectRef idx="0">
+            <a:schemeClr val="accent6"/>
+          </a:effectRef>
+          <a:fontRef idx="minor">
+            <a:schemeClr val="lt1"/>
+          </a:fontRef>
+        </p:style>
+        <p:txBody>
+          <a:bodyPr rtlCol="0" anchor="ctr"/>
+          <a:lstStyle/>
+          <a:p>
+            <a:pPr algn="ctr"/>
+            <a:r>
+              <a:rPr lang="de-DE" sz="1028" dirty="0" err="1"/>
+              <a:t>stored</a:t>
+            </a:r>
+            <a:r>
+              <a:rPr lang="de-DE" sz="1028" dirty="0"/>
+              <a:t> Dataset</a:t>
+            </a:r>
+            <a:endParaRPr lang="en-GB" sz="1028" dirty="0"/>
+          </a:p>
+        </p:txBody>
+      </p:sp>
+      <p:cxnSp>
+        <p:nvCxnSpPr>
+          <p:cNvPr id="63" name="Gerade Verbindung mit Pfeil 62">
+            <a:extLst>
+              <a:ext uri="{FF2B5EF4-FFF2-40B4-BE49-F238E27FC236}">
+                <a16:creationId xmlns:a16="http://schemas.microsoft.com/office/drawing/2014/main" id="{1E8F9521-D8B4-4152-BA2F-C0DEF7A78E0D}"/>
+              </a:ext>
+            </a:extLst>
+          </p:cNvPr>
+          <p:cNvCxnSpPr>
+            <a:cxnSpLocks/>
+            <a:endCxn id="62" idx="1"/>
+          </p:cNvCxnSpPr>
+          <p:nvPr/>
+        </p:nvCxnSpPr>
+        <p:spPr>
+          <a:xfrm>
+            <a:off x="7802481" y="1711745"/>
+            <a:ext cx="537819" cy="0"/>
+          </a:xfrm>
+          <a:prstGeom prst="straightConnector1">
+            <a:avLst/>
+          </a:prstGeom>
+          <a:ln>
+            <a:tailEnd type="triangle"/>
+          </a:ln>
+        </p:spPr>
+        <p:style>
+          <a:lnRef idx="1">
+            <a:schemeClr val="accent1"/>
+          </a:lnRef>
+          <a:fillRef idx="0">
+            <a:schemeClr val="accent1"/>
+          </a:fillRef>
+          <a:effectRef idx="0">
+            <a:schemeClr val="accent1"/>
+          </a:effectRef>
+          <a:fontRef idx="minor">
+            <a:schemeClr val="tx1"/>
+          </a:fontRef>
+        </p:style>
+      </p:cxnSp>
+    </p:spTree>
+    <p:extLst>
+      <p:ext uri="{BB962C8B-B14F-4D97-AF65-F5344CB8AC3E}">
+        <p14:creationId xmlns:p14="http://schemas.microsoft.com/office/powerpoint/2010/main" val="3225980603"/>
+      </p:ext>
+    </p:extLst>
+  </p:cSld>
+  <p:clrMapOvr>
+    <a:masterClrMapping/>
+  </p:clrMapOvr>
+</p:sld>
+</file>
+
+<file path=ppt/slides/slide3.xml><?xml version="1.0" encoding="utf-8"?>
+<p:sld xmlns:a="http://schemas.openxmlformats.org/drawingml/2006/main" xmlns:r="http://schemas.openxmlformats.org/officeDocument/2006/relationships" xmlns:p="http://schemas.openxmlformats.org/presentationml/2006/main">
+  <p:cSld>
+    <p:spTree>
+      <p:nvGrpSpPr>
+        <p:cNvPr id="1" name=""/>
+        <p:cNvGrpSpPr/>
+        <p:nvPr/>
+      </p:nvGrpSpPr>
+      <p:grpSpPr>
+        <a:xfrm>
+          <a:off x="0" y="0"/>
+          <a:ext cx="0" cy="0"/>
+          <a:chOff x="0" y="0"/>
+          <a:chExt cx="0" cy="0"/>
+        </a:xfrm>
+      </p:grpSpPr>
+      <p:sp>
+        <p:nvSpPr>
+          <p:cNvPr id="2" name="Rechteck 18">
+            <a:extLst>
+              <a:ext uri="{FF2B5EF4-FFF2-40B4-BE49-F238E27FC236}">
+                <a16:creationId xmlns:a16="http://schemas.microsoft.com/office/drawing/2014/main" id="{BE696CB9-2E92-4955-9540-8C5CCDD44FAE}"/>
+              </a:ext>
+            </a:extLst>
+          </p:cNvPr>
+          <p:cNvSpPr/>
+          <p:nvPr/>
+        </p:nvSpPr>
+        <p:spPr>
+          <a:xfrm>
+            <a:off x="2487799" y="167575"/>
+            <a:ext cx="2163566" cy="1373889"/>
+          </a:xfrm>
+          <a:prstGeom prst="rect">
+            <a:avLst/>
+          </a:prstGeom>
+        </p:spPr>
+        <p:style>
+          <a:lnRef idx="2">
+            <a:schemeClr val="accent4">
+              <a:shade val="50000"/>
+            </a:schemeClr>
+          </a:lnRef>
+          <a:fillRef idx="1">
+            <a:schemeClr val="accent4"/>
+          </a:fillRef>
+          <a:effectRef idx="0">
+            <a:schemeClr val="accent4"/>
+          </a:effectRef>
+          <a:fontRef idx="minor">
+            <a:schemeClr val="lt1"/>
+          </a:fontRef>
+        </p:style>
+        <p:txBody>
+          <a:bodyPr rtlCol="0" anchor="ctr"/>
+          <a:lstStyle/>
+          <a:p>
+            <a:pPr algn="ctr"/>
+            <a:endParaRPr lang="en-GB" sz="1028" dirty="0"/>
+          </a:p>
+        </p:txBody>
+      </p:sp>
+      <p:sp>
+        <p:nvSpPr>
+          <p:cNvPr id="3" name="Textfeld 19">
+            <a:extLst>
+              <a:ext uri="{FF2B5EF4-FFF2-40B4-BE49-F238E27FC236}">
+                <a16:creationId xmlns:a16="http://schemas.microsoft.com/office/drawing/2014/main" id="{555569D4-1CA4-4F38-BE38-0BB7A16D404B}"/>
+              </a:ext>
+            </a:extLst>
+          </p:cNvPr>
+          <p:cNvSpPr txBox="1"/>
+          <p:nvPr/>
+        </p:nvSpPr>
+        <p:spPr>
+          <a:xfrm>
+            <a:off x="2816647" y="221996"/>
+            <a:ext cx="1544012" cy="250518"/>
+          </a:xfrm>
+          <a:prstGeom prst="rect">
+            <a:avLst/>
+          </a:prstGeom>
+          <a:noFill/>
+        </p:spPr>
+        <p:txBody>
+          <a:bodyPr wrap="none" rtlCol="0">
+            <a:spAutoFit/>
+          </a:bodyPr>
+          <a:lstStyle/>
+          <a:p>
+            <a:r>
+              <a:rPr lang="de-DE" sz="1028" dirty="0" err="1">
+                <a:solidFill>
+                  <a:schemeClr val="bg1"/>
+                </a:solidFill>
+              </a:rPr>
+              <a:t>pointcloudset.PointCloud</a:t>
+            </a:r>
+            <a:endParaRPr lang="en-GB" sz="1028" dirty="0">
+              <a:solidFill>
+                <a:schemeClr val="bg1"/>
+              </a:solidFill>
+            </a:endParaRPr>
+          </a:p>
+        </p:txBody>
+      </p:sp>
+      <p:sp>
+        <p:nvSpPr>
+          <p:cNvPr id="4" name="Rechteck 2">
+            <a:extLst>
+              <a:ext uri="{FF2B5EF4-FFF2-40B4-BE49-F238E27FC236}">
+                <a16:creationId xmlns:a16="http://schemas.microsoft.com/office/drawing/2014/main" id="{C8F0826A-6DEA-4409-9FE7-B1AFC13089AC}"/>
+              </a:ext>
+            </a:extLst>
+          </p:cNvPr>
+          <p:cNvSpPr/>
+          <p:nvPr/>
+        </p:nvSpPr>
+        <p:spPr>
+          <a:xfrm>
+            <a:off x="72343" y="518094"/>
+            <a:ext cx="718159" cy="672851"/>
+          </a:xfrm>
+          <a:prstGeom prst="rect">
+            <a:avLst/>
+          </a:prstGeom>
+        </p:spPr>
+        <p:style>
+          <a:lnRef idx="2">
+            <a:schemeClr val="accent6">
+              <a:shade val="50000"/>
+            </a:schemeClr>
+          </a:lnRef>
+          <a:fillRef idx="1">
+            <a:schemeClr val="accent6"/>
+          </a:fillRef>
+          <a:effectRef idx="0">
+            <a:schemeClr val="accent6"/>
+          </a:effectRef>
+          <a:fontRef idx="minor">
+            <a:schemeClr val="lt1"/>
+          </a:fontRef>
+        </p:style>
+        <p:txBody>
+          <a:bodyPr rtlCol="0" anchor="ctr"/>
+          <a:lstStyle/>
+          <a:p>
+            <a:pPr algn="ctr"/>
+            <a:r>
+              <a:rPr lang="de-DE" sz="1028" dirty="0"/>
+              <a:t>.las</a:t>
+            </a:r>
+          </a:p>
+          <a:p>
+            <a:pPr algn="ctr"/>
+            <a:r>
+              <a:rPr lang="de-DE" sz="1028" dirty="0"/>
+              <a:t>.</a:t>
+            </a:r>
+            <a:r>
+              <a:rPr lang="de-DE" sz="1028" dirty="0" err="1"/>
+              <a:t>csv</a:t>
+            </a:r>
+            <a:endParaRPr lang="de-DE" sz="1028" dirty="0"/>
+          </a:p>
+          <a:p>
+            <a:pPr algn="ctr"/>
+            <a:r>
+              <a:rPr lang="de-DE" sz="1028" dirty="0"/>
+              <a:t>And </a:t>
+            </a:r>
+            <a:r>
+              <a:rPr lang="de-DE" sz="1028" dirty="0" err="1"/>
+              <a:t>more</a:t>
+            </a:r>
+            <a:endParaRPr lang="en-GB" sz="1028" dirty="0"/>
+          </a:p>
+        </p:txBody>
+      </p:sp>
+      <p:cxnSp>
+        <p:nvCxnSpPr>
+          <p:cNvPr id="5" name="Gerade Verbindung mit Pfeil 4">
+            <a:extLst>
+              <a:ext uri="{FF2B5EF4-FFF2-40B4-BE49-F238E27FC236}">
+                <a16:creationId xmlns:a16="http://schemas.microsoft.com/office/drawing/2014/main" id="{849AB70B-DDAF-45D6-9CC5-91F67DA93463}"/>
+              </a:ext>
+            </a:extLst>
+          </p:cNvPr>
+          <p:cNvCxnSpPr>
+            <a:cxnSpLocks/>
+            <a:stCxn id="4" idx="3"/>
+            <a:endCxn id="2" idx="1"/>
+          </p:cNvCxnSpPr>
+          <p:nvPr/>
+        </p:nvCxnSpPr>
+        <p:spPr bwMode="auto">
+          <a:xfrm>
+            <a:off x="790502" y="854520"/>
+            <a:ext cx="1697297" cy="0"/>
+          </a:xfrm>
+          <a:prstGeom prst="straightConnector1">
+            <a:avLst/>
+          </a:prstGeom>
+          <a:noFill/>
+          <a:ln w="9525" cap="flat" cmpd="sng" algn="ctr">
+            <a:solidFill>
+              <a:schemeClr val="tx1"/>
+            </a:solidFill>
+            <a:prstDash val="solid"/>
+            <a:round/>
+            <a:headEnd type="none" w="med" len="med"/>
+            <a:tailEnd type="triangle"/>
+          </a:ln>
+          <a:effectLst/>
+        </p:spPr>
+      </p:cxnSp>
+      <p:sp>
+        <p:nvSpPr>
+          <p:cNvPr id="6" name="Textfeld 5">
+            <a:extLst>
+              <a:ext uri="{FF2B5EF4-FFF2-40B4-BE49-F238E27FC236}">
+                <a16:creationId xmlns:a16="http://schemas.microsoft.com/office/drawing/2014/main" id="{8613A152-ED81-4C87-9488-548FD2939B44}"/>
+              </a:ext>
+            </a:extLst>
+          </p:cNvPr>
+          <p:cNvSpPr txBox="1"/>
+          <p:nvPr/>
+        </p:nvSpPr>
+        <p:spPr>
+          <a:xfrm>
+            <a:off x="896065" y="635609"/>
+            <a:ext cx="1380506" cy="250518"/>
+          </a:xfrm>
+          <a:prstGeom prst="rect">
+            <a:avLst/>
+          </a:prstGeom>
+          <a:noFill/>
+        </p:spPr>
+        <p:txBody>
+          <a:bodyPr wrap="none" rtlCol="0">
+            <a:spAutoFit/>
+          </a:bodyPr>
+          <a:lstStyle/>
+          <a:p>
+            <a:r>
+              <a:rPr lang="de-DE" sz="1028" dirty="0" err="1"/>
+              <a:t>PointCloud.from_file</a:t>
+            </a:r>
+            <a:r>
+              <a:rPr lang="de-DE" sz="1028" dirty="0"/>
+              <a:t>()</a:t>
+            </a:r>
+            <a:endParaRPr lang="en-GB" sz="1028" dirty="0"/>
+          </a:p>
+        </p:txBody>
+      </p:sp>
+      <p:sp>
+        <p:nvSpPr>
+          <p:cNvPr id="7" name="Textfeld 6">
+            <a:extLst>
+              <a:ext uri="{FF2B5EF4-FFF2-40B4-BE49-F238E27FC236}">
+                <a16:creationId xmlns:a16="http://schemas.microsoft.com/office/drawing/2014/main" id="{9FA3070A-8EEF-4FF1-B7DC-9CAE06763A08}"/>
+              </a:ext>
+            </a:extLst>
+          </p:cNvPr>
+          <p:cNvSpPr txBox="1"/>
+          <p:nvPr/>
+        </p:nvSpPr>
+        <p:spPr>
+          <a:xfrm>
+            <a:off x="2543309" y="510350"/>
+            <a:ext cx="423514" cy="250518"/>
+          </a:xfrm>
+          <a:prstGeom prst="rect">
+            <a:avLst/>
+          </a:prstGeom>
+          <a:noFill/>
+        </p:spPr>
+        <p:txBody>
+          <a:bodyPr wrap="none" rtlCol="0">
+            <a:spAutoFit/>
+          </a:bodyPr>
+          <a:lstStyle/>
+          <a:p>
+            <a:r>
+              <a:rPr lang="de-DE" sz="1028" dirty="0" err="1">
+                <a:solidFill>
+                  <a:schemeClr val="bg1"/>
+                </a:solidFill>
+              </a:rPr>
+              <a:t>data</a:t>
+            </a:r>
+            <a:endParaRPr lang="en-GB" sz="1028" dirty="0">
+              <a:solidFill>
+                <a:schemeClr val="bg1"/>
+              </a:solidFill>
+            </a:endParaRPr>
+          </a:p>
+        </p:txBody>
+      </p:sp>
+      <p:sp>
+        <p:nvSpPr>
+          <p:cNvPr id="8" name="Textfeld 7">
+            <a:extLst>
+              <a:ext uri="{FF2B5EF4-FFF2-40B4-BE49-F238E27FC236}">
+                <a16:creationId xmlns:a16="http://schemas.microsoft.com/office/drawing/2014/main" id="{DE703C1C-4CC8-45D0-A363-FFC2F3C54ECA}"/>
+              </a:ext>
+            </a:extLst>
+          </p:cNvPr>
+          <p:cNvSpPr txBox="1"/>
+          <p:nvPr/>
+        </p:nvSpPr>
+        <p:spPr>
+          <a:xfrm>
+            <a:off x="2543310" y="716775"/>
+            <a:ext cx="518091" cy="250518"/>
+          </a:xfrm>
+          <a:prstGeom prst="rect">
+            <a:avLst/>
+          </a:prstGeom>
+          <a:noFill/>
+        </p:spPr>
+        <p:txBody>
+          <a:bodyPr wrap="none" rtlCol="0">
+            <a:spAutoFit/>
+          </a:bodyPr>
+          <a:lstStyle/>
+          <a:p>
+            <a:r>
+              <a:rPr lang="de-DE" sz="1028" dirty="0" err="1">
+                <a:solidFill>
+                  <a:schemeClr val="bg1"/>
+                </a:solidFill>
+              </a:rPr>
+              <a:t>points</a:t>
+            </a:r>
+            <a:endParaRPr lang="en-GB" sz="1028" dirty="0">
+              <a:solidFill>
+                <a:schemeClr val="bg1"/>
+              </a:solidFill>
+            </a:endParaRPr>
+          </a:p>
+        </p:txBody>
+      </p:sp>
+      <p:sp>
+        <p:nvSpPr>
+          <p:cNvPr id="9" name="Textfeld 8">
+            <a:extLst>
+              <a:ext uri="{FF2B5EF4-FFF2-40B4-BE49-F238E27FC236}">
+                <a16:creationId xmlns:a16="http://schemas.microsoft.com/office/drawing/2014/main" id="{33E1A08A-EFC9-4356-A14D-47A2F1AF6613}"/>
+              </a:ext>
+            </a:extLst>
+          </p:cNvPr>
+          <p:cNvSpPr txBox="1"/>
+          <p:nvPr/>
+        </p:nvSpPr>
+        <p:spPr>
+          <a:xfrm>
+            <a:off x="2535331" y="958544"/>
+            <a:ext cx="764953" cy="250518"/>
+          </a:xfrm>
+          <a:prstGeom prst="rect">
+            <a:avLst/>
+          </a:prstGeom>
+          <a:noFill/>
+        </p:spPr>
+        <p:txBody>
+          <a:bodyPr wrap="none" rtlCol="0">
+            <a:spAutoFit/>
+          </a:bodyPr>
+          <a:lstStyle/>
+          <a:p>
+            <a:r>
+              <a:rPr lang="de-DE" sz="1028" dirty="0" err="1">
+                <a:solidFill>
+                  <a:schemeClr val="bg1"/>
+                </a:solidFill>
+              </a:rPr>
+              <a:t>timestamp</a:t>
+            </a:r>
+            <a:endParaRPr lang="en-GB" sz="1028" dirty="0">
+              <a:solidFill>
+                <a:schemeClr val="bg1"/>
+              </a:solidFill>
+            </a:endParaRPr>
+          </a:p>
+        </p:txBody>
+      </p:sp>
+      <p:sp>
+        <p:nvSpPr>
+          <p:cNvPr id="10" name="Textfeld 9">
+            <a:extLst>
+              <a:ext uri="{FF2B5EF4-FFF2-40B4-BE49-F238E27FC236}">
+                <a16:creationId xmlns:a16="http://schemas.microsoft.com/office/drawing/2014/main" id="{E7A99595-0E81-4091-93BC-DD902CB86592}"/>
+              </a:ext>
+            </a:extLst>
+          </p:cNvPr>
+          <p:cNvSpPr txBox="1"/>
+          <p:nvPr/>
+        </p:nvSpPr>
+        <p:spPr>
+          <a:xfrm>
+            <a:off x="2543310" y="1220925"/>
+            <a:ext cx="625492" cy="250518"/>
+          </a:xfrm>
+          <a:prstGeom prst="rect">
+            <a:avLst/>
+          </a:prstGeom>
+          <a:noFill/>
+        </p:spPr>
+        <p:txBody>
+          <a:bodyPr wrap="none" rtlCol="0">
+            <a:spAutoFit/>
+          </a:bodyPr>
+          <a:lstStyle/>
+          <a:p>
+            <a:r>
+              <a:rPr lang="de-DE" sz="1028" dirty="0" err="1">
+                <a:solidFill>
+                  <a:schemeClr val="bg1"/>
+                </a:solidFill>
+              </a:rPr>
+              <a:t>orig_file</a:t>
+            </a:r>
+            <a:endParaRPr lang="en-GB" sz="1028" dirty="0">
+              <a:solidFill>
+                <a:schemeClr val="bg1"/>
+              </a:solidFill>
+            </a:endParaRPr>
+          </a:p>
+        </p:txBody>
+      </p:sp>
+      <p:pic>
+        <p:nvPicPr>
+          <p:cNvPr id="11" name="Picture 2" descr="pandas (Software) – Wikipedia">
+            <a:extLst>
+              <a:ext uri="{FF2B5EF4-FFF2-40B4-BE49-F238E27FC236}">
+                <a16:creationId xmlns:a16="http://schemas.microsoft.com/office/drawing/2014/main" id="{B2763C47-14D6-4484-B385-56030139C69A}"/>
+              </a:ext>
+            </a:extLst>
+          </p:cNvPr>
+          <p:cNvPicPr>
+            <a:picLocks noChangeAspect="1" noChangeArrowheads="1"/>
+          </p:cNvPicPr>
+          <p:nvPr/>
+        </p:nvPicPr>
+        <p:blipFill>
+          <a:blip r:embed="rId2" cstate="print">
+            <a:extLst>
+              <a:ext uri="{28A0092B-C50C-407E-A947-70E740481C1C}">
+                <a14:useLocalDpi xmlns:a14="http://schemas.microsoft.com/office/drawing/2010/main" val="0"/>
+              </a:ext>
+            </a:extLst>
+          </a:blip>
+          <a:srcRect/>
+          <a:stretch>
+            <a:fillRect/>
+          </a:stretch>
+        </p:blipFill>
+        <p:spPr bwMode="auto">
+          <a:xfrm>
+            <a:off x="4028185" y="523092"/>
+            <a:ext cx="499768" cy="202456"/>
+          </a:xfrm>
+          <a:prstGeom prst="rect">
+            <a:avLst/>
+          </a:prstGeom>
+          <a:noFill/>
+          <a:extLst>
+            <a:ext uri="{909E8E84-426E-40DD-AFC4-6F175D3DCCD1}">
+              <a14:hiddenFill xmlns:a14="http://schemas.microsoft.com/office/drawing/2010/main">
+                <a:solidFill>
+                  <a:srgbClr val="FFFFFF"/>
+                </a:solidFill>
+              </a14:hiddenFill>
+            </a:ext>
+          </a:extLst>
+        </p:spPr>
+      </p:pic>
+      <p:sp>
+        <p:nvSpPr>
+          <p:cNvPr id="12" name="Textfeld 11">
+            <a:extLst>
+              <a:ext uri="{FF2B5EF4-FFF2-40B4-BE49-F238E27FC236}">
+                <a16:creationId xmlns:a16="http://schemas.microsoft.com/office/drawing/2014/main" id="{0EF478DB-EA60-40A8-A622-DAB7EE16BB15}"/>
+              </a:ext>
+            </a:extLst>
+          </p:cNvPr>
+          <p:cNvSpPr txBox="1"/>
+          <p:nvPr/>
+        </p:nvSpPr>
+        <p:spPr>
+          <a:xfrm>
+            <a:off x="3943267" y="741136"/>
+            <a:ext cx="720069" cy="250518"/>
+          </a:xfrm>
+          <a:prstGeom prst="rect">
+            <a:avLst/>
+          </a:prstGeom>
+          <a:noFill/>
+        </p:spPr>
+        <p:txBody>
+          <a:bodyPr wrap="none" rtlCol="0">
+            <a:spAutoFit/>
+          </a:bodyPr>
+          <a:lstStyle/>
+          <a:p>
+            <a:r>
+              <a:rPr lang="de-DE" sz="1028" dirty="0" err="1">
+                <a:solidFill>
+                  <a:schemeClr val="bg1"/>
+                </a:solidFill>
+              </a:rPr>
+              <a:t>pyntcloud</a:t>
+            </a:r>
+            <a:endParaRPr lang="en-GB" sz="1028" dirty="0">
+              <a:solidFill>
+                <a:schemeClr val="bg1"/>
+              </a:solidFill>
+            </a:endParaRPr>
+          </a:p>
+        </p:txBody>
+      </p:sp>
+      <p:sp>
+        <p:nvSpPr>
+          <p:cNvPr id="13" name="Textfeld 12">
+            <a:extLst>
+              <a:ext uri="{FF2B5EF4-FFF2-40B4-BE49-F238E27FC236}">
+                <a16:creationId xmlns:a16="http://schemas.microsoft.com/office/drawing/2014/main" id="{A9A4D259-0842-4010-BFD6-3AB1D0B7F51B}"/>
+              </a:ext>
+            </a:extLst>
+          </p:cNvPr>
+          <p:cNvSpPr txBox="1"/>
+          <p:nvPr/>
+        </p:nvSpPr>
+        <p:spPr>
+          <a:xfrm>
+            <a:off x="3943267" y="953539"/>
+            <a:ext cx="673582" cy="250518"/>
+          </a:xfrm>
+          <a:prstGeom prst="rect">
+            <a:avLst/>
+          </a:prstGeom>
+          <a:noFill/>
+        </p:spPr>
+        <p:txBody>
+          <a:bodyPr wrap="none" rtlCol="0">
+            <a:spAutoFit/>
+          </a:bodyPr>
+          <a:lstStyle/>
+          <a:p>
+            <a:r>
+              <a:rPr lang="de-DE" sz="1028" dirty="0" err="1">
+                <a:solidFill>
+                  <a:schemeClr val="bg1"/>
+                </a:solidFill>
+              </a:rPr>
+              <a:t>datetime</a:t>
+            </a:r>
+            <a:endParaRPr lang="en-GB" sz="1028" dirty="0">
+              <a:solidFill>
+                <a:schemeClr val="bg1"/>
+              </a:solidFill>
+            </a:endParaRPr>
+          </a:p>
+        </p:txBody>
+      </p:sp>
+      <p:sp>
+        <p:nvSpPr>
+          <p:cNvPr id="14" name="Textfeld 13">
+            <a:extLst>
+              <a:ext uri="{FF2B5EF4-FFF2-40B4-BE49-F238E27FC236}">
+                <a16:creationId xmlns:a16="http://schemas.microsoft.com/office/drawing/2014/main" id="{F0197811-55CD-4640-BED4-A9742F675565}"/>
+              </a:ext>
+            </a:extLst>
+          </p:cNvPr>
+          <p:cNvSpPr txBox="1"/>
+          <p:nvPr/>
+        </p:nvSpPr>
+        <p:spPr>
+          <a:xfrm>
+            <a:off x="3988661" y="1186899"/>
+            <a:ext cx="327334" cy="250518"/>
+          </a:xfrm>
+          <a:prstGeom prst="rect">
+            <a:avLst/>
+          </a:prstGeom>
+          <a:noFill/>
+        </p:spPr>
+        <p:txBody>
+          <a:bodyPr wrap="none" rtlCol="0">
+            <a:spAutoFit/>
+          </a:bodyPr>
+          <a:lstStyle/>
+          <a:p>
+            <a:r>
+              <a:rPr lang="de-DE" sz="1028" dirty="0" err="1">
+                <a:solidFill>
+                  <a:schemeClr val="bg1"/>
+                </a:solidFill>
+              </a:rPr>
+              <a:t>str</a:t>
+            </a:r>
+            <a:endParaRPr lang="en-GB" sz="1028" dirty="0">
+              <a:solidFill>
+                <a:schemeClr val="bg1"/>
+              </a:solidFill>
+            </a:endParaRPr>
+          </a:p>
+        </p:txBody>
+      </p:sp>
+    </p:spTree>
+    <p:extLst>
+      <p:ext uri="{BB962C8B-B14F-4D97-AF65-F5344CB8AC3E}">
+        <p14:creationId xmlns:p14="http://schemas.microsoft.com/office/powerpoint/2010/main" val="2312552727"/>
       </p:ext>
     </p:extLst>
   </p:cSld>

</xml_diff>

<commit_message>
added export options for frames in fig
</commit_message>
<xml_diff>
--- a/paper/figures/data_pipeline.pptx
+++ b/paper/figures/data_pipeline.pptx
@@ -199,7 +199,7 @@
           <a:p>
             <a:fld id="{ACC8D1E5-734B-D648-9544-C1B3E7710CE7}" type="datetimeFigureOut">
               <a:rPr lang="en-GB" smtClean="0"/>
-              <a:t>28/04/2021</a:t>
+              <a:t>03/05/2021</a:t>
             </a:fld>
             <a:endParaRPr lang="en-GB"/>
           </a:p>
@@ -686,7 +686,7 @@
           <a:p>
             <a:fld id="{70A666A6-2FAB-D348-B19D-8A510A298A73}" type="datetimeFigureOut">
               <a:rPr lang="en-GB" smtClean="0"/>
-              <a:t>28/04/2021</a:t>
+              <a:t>03/05/2021</a:t>
             </a:fld>
             <a:endParaRPr lang="en-GB"/>
           </a:p>
@@ -856,7 +856,7 @@
           <a:p>
             <a:fld id="{70A666A6-2FAB-D348-B19D-8A510A298A73}" type="datetimeFigureOut">
               <a:rPr lang="en-GB" smtClean="0"/>
-              <a:t>28/04/2021</a:t>
+              <a:t>03/05/2021</a:t>
             </a:fld>
             <a:endParaRPr lang="en-GB"/>
           </a:p>
@@ -1036,7 +1036,7 @@
           <a:p>
             <a:fld id="{70A666A6-2FAB-D348-B19D-8A510A298A73}" type="datetimeFigureOut">
               <a:rPr lang="en-GB" smtClean="0"/>
-              <a:t>28/04/2021</a:t>
+              <a:t>03/05/2021</a:t>
             </a:fld>
             <a:endParaRPr lang="en-GB"/>
           </a:p>
@@ -1473,7 +1473,7 @@
           <a:p>
             <a:fld id="{70A666A6-2FAB-D348-B19D-8A510A298A73}" type="datetimeFigureOut">
               <a:rPr lang="en-GB" smtClean="0"/>
-              <a:t>28/04/2021</a:t>
+              <a:t>03/05/2021</a:t>
             </a:fld>
             <a:endParaRPr lang="en-GB"/>
           </a:p>
@@ -1719,7 +1719,7 @@
           <a:p>
             <a:fld id="{70A666A6-2FAB-D348-B19D-8A510A298A73}" type="datetimeFigureOut">
               <a:rPr lang="en-GB" smtClean="0"/>
-              <a:t>28/04/2021</a:t>
+              <a:t>03/05/2021</a:t>
             </a:fld>
             <a:endParaRPr lang="en-GB"/>
           </a:p>
@@ -1951,7 +1951,7 @@
           <a:p>
             <a:fld id="{70A666A6-2FAB-D348-B19D-8A510A298A73}" type="datetimeFigureOut">
               <a:rPr lang="en-GB" smtClean="0"/>
-              <a:t>28/04/2021</a:t>
+              <a:t>03/05/2021</a:t>
             </a:fld>
             <a:endParaRPr lang="en-GB"/>
           </a:p>
@@ -2318,7 +2318,7 @@
           <a:p>
             <a:fld id="{70A666A6-2FAB-D348-B19D-8A510A298A73}" type="datetimeFigureOut">
               <a:rPr lang="en-GB" smtClean="0"/>
-              <a:t>28/04/2021</a:t>
+              <a:t>03/05/2021</a:t>
             </a:fld>
             <a:endParaRPr lang="en-GB"/>
           </a:p>
@@ -2436,7 +2436,7 @@
           <a:p>
             <a:fld id="{70A666A6-2FAB-D348-B19D-8A510A298A73}" type="datetimeFigureOut">
               <a:rPr lang="en-GB" smtClean="0"/>
-              <a:t>28/04/2021</a:t>
+              <a:t>03/05/2021</a:t>
             </a:fld>
             <a:endParaRPr lang="en-GB"/>
           </a:p>
@@ -2531,7 +2531,7 @@
           <a:p>
             <a:fld id="{70A666A6-2FAB-D348-B19D-8A510A298A73}" type="datetimeFigureOut">
               <a:rPr lang="en-GB" smtClean="0"/>
-              <a:t>28/04/2021</a:t>
+              <a:t>03/05/2021</a:t>
             </a:fld>
             <a:endParaRPr lang="en-GB"/>
           </a:p>
@@ -2808,7 +2808,7 @@
           <a:p>
             <a:fld id="{70A666A6-2FAB-D348-B19D-8A510A298A73}" type="datetimeFigureOut">
               <a:rPr lang="en-GB" smtClean="0"/>
-              <a:t>28/04/2021</a:t>
+              <a:t>03/05/2021</a:t>
             </a:fld>
             <a:endParaRPr lang="en-GB"/>
           </a:p>
@@ -3065,7 +3065,7 @@
           <a:p>
             <a:fld id="{70A666A6-2FAB-D348-B19D-8A510A298A73}" type="datetimeFigureOut">
               <a:rPr lang="en-GB" smtClean="0"/>
-              <a:t>28/04/2021</a:t>
+              <a:t>03/05/2021</a:t>
             </a:fld>
             <a:endParaRPr lang="en-GB"/>
           </a:p>
@@ -3278,7 +3278,7 @@
           <a:p>
             <a:fld id="{70A666A6-2FAB-D348-B19D-8A510A298A73}" type="datetimeFigureOut">
               <a:rPr lang="en-GB" smtClean="0"/>
-              <a:t>28/04/2021</a:t>
+              <a:t>03/05/2021</a:t>
             </a:fld>
             <a:endParaRPr lang="en-GB"/>
           </a:p>
@@ -7419,6 +7419,116 @@
           </a:p>
         </p:txBody>
       </p:sp>
+      <p:sp>
+        <p:nvSpPr>
+          <p:cNvPr id="15" name="Rechteck 2">
+            <a:extLst>
+              <a:ext uri="{FF2B5EF4-FFF2-40B4-BE49-F238E27FC236}">
+                <a16:creationId xmlns:a16="http://schemas.microsoft.com/office/drawing/2014/main" id="{BE697381-DBC6-408B-BEEB-CF1AC95F3379}"/>
+              </a:ext>
+            </a:extLst>
+          </p:cNvPr>
+          <p:cNvSpPr/>
+          <p:nvPr/>
+        </p:nvSpPr>
+        <p:spPr>
+          <a:xfrm>
+            <a:off x="5224553" y="536211"/>
+            <a:ext cx="718159" cy="672851"/>
+          </a:xfrm>
+          <a:prstGeom prst="rect">
+            <a:avLst/>
+          </a:prstGeom>
+        </p:spPr>
+        <p:style>
+          <a:lnRef idx="2">
+            <a:schemeClr val="accent6">
+              <a:shade val="50000"/>
+            </a:schemeClr>
+          </a:lnRef>
+          <a:fillRef idx="1">
+            <a:schemeClr val="accent6"/>
+          </a:fillRef>
+          <a:effectRef idx="0">
+            <a:schemeClr val="accent6"/>
+          </a:effectRef>
+          <a:fontRef idx="minor">
+            <a:schemeClr val="lt1"/>
+          </a:fontRef>
+        </p:style>
+        <p:txBody>
+          <a:bodyPr rtlCol="0" anchor="ctr"/>
+          <a:lstStyle/>
+          <a:p>
+            <a:pPr algn="ctr"/>
+            <a:r>
+              <a:rPr lang="de-DE" sz="1028" dirty="0"/>
+              <a:t>.las</a:t>
+            </a:r>
+          </a:p>
+          <a:p>
+            <a:pPr algn="ctr"/>
+            <a:r>
+              <a:rPr lang="de-DE" sz="1028" dirty="0"/>
+              <a:t>.</a:t>
+            </a:r>
+            <a:r>
+              <a:rPr lang="de-DE" sz="1028" dirty="0" err="1"/>
+              <a:t>csv</a:t>
+            </a:r>
+            <a:endParaRPr lang="de-DE" sz="1028" dirty="0"/>
+          </a:p>
+          <a:p>
+            <a:pPr algn="ctr"/>
+            <a:r>
+              <a:rPr lang="de-DE" sz="1028" dirty="0"/>
+              <a:t>And </a:t>
+            </a:r>
+            <a:r>
+              <a:rPr lang="de-DE" sz="1028" dirty="0" err="1"/>
+              <a:t>more</a:t>
+            </a:r>
+            <a:endParaRPr lang="en-GB" sz="1028" dirty="0"/>
+          </a:p>
+        </p:txBody>
+      </p:sp>
+      <p:cxnSp>
+        <p:nvCxnSpPr>
+          <p:cNvPr id="16" name="Gerade Verbindung mit Pfeil 15">
+            <a:extLst>
+              <a:ext uri="{FF2B5EF4-FFF2-40B4-BE49-F238E27FC236}">
+                <a16:creationId xmlns:a16="http://schemas.microsoft.com/office/drawing/2014/main" id="{6CAAEFC2-E84E-4594-AA0E-3CBAC159D114}"/>
+              </a:ext>
+            </a:extLst>
+          </p:cNvPr>
+          <p:cNvCxnSpPr>
+            <a:cxnSpLocks/>
+            <a:stCxn id="12" idx="3"/>
+            <a:endCxn id="15" idx="1"/>
+          </p:cNvCxnSpPr>
+          <p:nvPr/>
+        </p:nvCxnSpPr>
+        <p:spPr bwMode="auto">
+          <a:xfrm>
+            <a:off x="4663336" y="866395"/>
+            <a:ext cx="561217" cy="6242"/>
+          </a:xfrm>
+          <a:prstGeom prst="straightConnector1">
+            <a:avLst/>
+          </a:prstGeom>
+          <a:noFill/>
+          <a:ln w="9525" cap="flat" cmpd="sng" algn="ctr">
+            <a:solidFill>
+              <a:schemeClr val="tx1"/>
+            </a:solidFill>
+            <a:prstDash val="solid"/>
+            <a:round/>
+            <a:headEnd type="none" w="med" len="med"/>
+            <a:tailEnd type="triangle"/>
+          </a:ln>
+          <a:effectLst/>
+        </p:spPr>
+      </p:cxnSp>
     </p:spTree>
     <p:extLst>
       <p:ext uri="{BB962C8B-B14F-4D97-AF65-F5344CB8AC3E}">

</xml_diff>

<commit_message>
updated data pipeline image
</commit_message>
<xml_diff>
--- a/paper/figures/data_pipeline.pptx
+++ b/paper/figures/data_pipeline.pptx
@@ -199,7 +199,7 @@
           <a:p>
             <a:fld id="{ACC8D1E5-734B-D648-9544-C1B3E7710CE7}" type="datetimeFigureOut">
               <a:rPr lang="en-GB" smtClean="0"/>
-              <a:t>03/05/2021</a:t>
+              <a:t>06/05/2021</a:t>
             </a:fld>
             <a:endParaRPr lang="en-GB"/>
           </a:p>
@@ -686,7 +686,7 @@
           <a:p>
             <a:fld id="{70A666A6-2FAB-D348-B19D-8A510A298A73}" type="datetimeFigureOut">
               <a:rPr lang="en-GB" smtClean="0"/>
-              <a:t>03/05/2021</a:t>
+              <a:t>06/05/2021</a:t>
             </a:fld>
             <a:endParaRPr lang="en-GB"/>
           </a:p>
@@ -856,7 +856,7 @@
           <a:p>
             <a:fld id="{70A666A6-2FAB-D348-B19D-8A510A298A73}" type="datetimeFigureOut">
               <a:rPr lang="en-GB" smtClean="0"/>
-              <a:t>03/05/2021</a:t>
+              <a:t>06/05/2021</a:t>
             </a:fld>
             <a:endParaRPr lang="en-GB"/>
           </a:p>
@@ -1036,7 +1036,7 @@
           <a:p>
             <a:fld id="{70A666A6-2FAB-D348-B19D-8A510A298A73}" type="datetimeFigureOut">
               <a:rPr lang="en-GB" smtClean="0"/>
-              <a:t>03/05/2021</a:t>
+              <a:t>06/05/2021</a:t>
             </a:fld>
             <a:endParaRPr lang="en-GB"/>
           </a:p>
@@ -1473,7 +1473,7 @@
           <a:p>
             <a:fld id="{70A666A6-2FAB-D348-B19D-8A510A298A73}" type="datetimeFigureOut">
               <a:rPr lang="en-GB" smtClean="0"/>
-              <a:t>03/05/2021</a:t>
+              <a:t>06/05/2021</a:t>
             </a:fld>
             <a:endParaRPr lang="en-GB"/>
           </a:p>
@@ -1719,7 +1719,7 @@
           <a:p>
             <a:fld id="{70A666A6-2FAB-D348-B19D-8A510A298A73}" type="datetimeFigureOut">
               <a:rPr lang="en-GB" smtClean="0"/>
-              <a:t>03/05/2021</a:t>
+              <a:t>06/05/2021</a:t>
             </a:fld>
             <a:endParaRPr lang="en-GB"/>
           </a:p>
@@ -1951,7 +1951,7 @@
           <a:p>
             <a:fld id="{70A666A6-2FAB-D348-B19D-8A510A298A73}" type="datetimeFigureOut">
               <a:rPr lang="en-GB" smtClean="0"/>
-              <a:t>03/05/2021</a:t>
+              <a:t>06/05/2021</a:t>
             </a:fld>
             <a:endParaRPr lang="en-GB"/>
           </a:p>
@@ -2318,7 +2318,7 @@
           <a:p>
             <a:fld id="{70A666A6-2FAB-D348-B19D-8A510A298A73}" type="datetimeFigureOut">
               <a:rPr lang="en-GB" smtClean="0"/>
-              <a:t>03/05/2021</a:t>
+              <a:t>06/05/2021</a:t>
             </a:fld>
             <a:endParaRPr lang="en-GB"/>
           </a:p>
@@ -2436,7 +2436,7 @@
           <a:p>
             <a:fld id="{70A666A6-2FAB-D348-B19D-8A510A298A73}" type="datetimeFigureOut">
               <a:rPr lang="en-GB" smtClean="0"/>
-              <a:t>03/05/2021</a:t>
+              <a:t>06/05/2021</a:t>
             </a:fld>
             <a:endParaRPr lang="en-GB"/>
           </a:p>
@@ -2531,7 +2531,7 @@
           <a:p>
             <a:fld id="{70A666A6-2FAB-D348-B19D-8A510A298A73}" type="datetimeFigureOut">
               <a:rPr lang="en-GB" smtClean="0"/>
-              <a:t>03/05/2021</a:t>
+              <a:t>06/05/2021</a:t>
             </a:fld>
             <a:endParaRPr lang="en-GB"/>
           </a:p>
@@ -2808,7 +2808,7 @@
           <a:p>
             <a:fld id="{70A666A6-2FAB-D348-B19D-8A510A298A73}" type="datetimeFigureOut">
               <a:rPr lang="en-GB" smtClean="0"/>
-              <a:t>03/05/2021</a:t>
+              <a:t>06/05/2021</a:t>
             </a:fld>
             <a:endParaRPr lang="en-GB"/>
           </a:p>
@@ -3065,7 +3065,7 @@
           <a:p>
             <a:fld id="{70A666A6-2FAB-D348-B19D-8A510A298A73}" type="datetimeFigureOut">
               <a:rPr lang="en-GB" smtClean="0"/>
-              <a:t>03/05/2021</a:t>
+              <a:t>06/05/2021</a:t>
             </a:fld>
             <a:endParaRPr lang="en-GB"/>
           </a:p>
@@ -3278,7 +3278,7 @@
           <a:p>
             <a:fld id="{70A666A6-2FAB-D348-B19D-8A510A298A73}" type="datetimeFigureOut">
               <a:rPr lang="en-GB" smtClean="0"/>
-              <a:t>03/05/2021</a:t>
+              <a:t>06/05/2021</a:t>
             </a:fld>
             <a:endParaRPr lang="en-GB"/>
           </a:p>

</xml_diff>